<commit_message>
Diagramas de flujo terminados en texto.
</commit_message>
<xml_diff>
--- a/Diagramas_de_flujo.pptx
+++ b/Diagramas_de_flujo.pptx
@@ -15,6 +15,12 @@
     <p:sldId id="263" r:id="rId9"/>
     <p:sldId id="264" r:id="rId10"/>
     <p:sldId id="265" r:id="rId11"/>
+    <p:sldId id="266" r:id="rId12"/>
+    <p:sldId id="267" r:id="rId13"/>
+    <p:sldId id="268" r:id="rId14"/>
+    <p:sldId id="269" r:id="rId15"/>
+    <p:sldId id="270" r:id="rId16"/>
+    <p:sldId id="271" r:id="rId17"/>
   </p:sldIdLst>
   <p:sldSz cx="12192000" cy="6858000"/>
   <p:notesSz cx="6858000" cy="9144000"/>
@@ -270,7 +276,7 @@
           <a:p>
             <a:fld id="{46728522-0A0C-4B69-AA92-5B61FB9D1D81}" type="datetimeFigureOut">
               <a:rPr lang="es-MX" smtClean="0"/>
-              <a:t>09/10/2019</a:t>
+              <a:t>10/10/2019</a:t>
             </a:fld>
             <a:endParaRPr lang="es-MX"/>
           </a:p>
@@ -470,7 +476,7 @@
           <a:p>
             <a:fld id="{46728522-0A0C-4B69-AA92-5B61FB9D1D81}" type="datetimeFigureOut">
               <a:rPr lang="es-MX" smtClean="0"/>
-              <a:t>09/10/2019</a:t>
+              <a:t>10/10/2019</a:t>
             </a:fld>
             <a:endParaRPr lang="es-MX"/>
           </a:p>
@@ -680,7 +686,7 @@
           <a:p>
             <a:fld id="{46728522-0A0C-4B69-AA92-5B61FB9D1D81}" type="datetimeFigureOut">
               <a:rPr lang="es-MX" smtClean="0"/>
-              <a:t>09/10/2019</a:t>
+              <a:t>10/10/2019</a:t>
             </a:fld>
             <a:endParaRPr lang="es-MX"/>
           </a:p>
@@ -880,7 +886,7 @@
           <a:p>
             <a:fld id="{46728522-0A0C-4B69-AA92-5B61FB9D1D81}" type="datetimeFigureOut">
               <a:rPr lang="es-MX" smtClean="0"/>
-              <a:t>09/10/2019</a:t>
+              <a:t>10/10/2019</a:t>
             </a:fld>
             <a:endParaRPr lang="es-MX"/>
           </a:p>
@@ -1156,7 +1162,7 @@
           <a:p>
             <a:fld id="{46728522-0A0C-4B69-AA92-5B61FB9D1D81}" type="datetimeFigureOut">
               <a:rPr lang="es-MX" smtClean="0"/>
-              <a:t>09/10/2019</a:t>
+              <a:t>10/10/2019</a:t>
             </a:fld>
             <a:endParaRPr lang="es-MX"/>
           </a:p>
@@ -1424,7 +1430,7 @@
           <a:p>
             <a:fld id="{46728522-0A0C-4B69-AA92-5B61FB9D1D81}" type="datetimeFigureOut">
               <a:rPr lang="es-MX" smtClean="0"/>
-              <a:t>09/10/2019</a:t>
+              <a:t>10/10/2019</a:t>
             </a:fld>
             <a:endParaRPr lang="es-MX"/>
           </a:p>
@@ -1839,7 +1845,7 @@
           <a:p>
             <a:fld id="{46728522-0A0C-4B69-AA92-5B61FB9D1D81}" type="datetimeFigureOut">
               <a:rPr lang="es-MX" smtClean="0"/>
-              <a:t>09/10/2019</a:t>
+              <a:t>10/10/2019</a:t>
             </a:fld>
             <a:endParaRPr lang="es-MX"/>
           </a:p>
@@ -1981,7 +1987,7 @@
           <a:p>
             <a:fld id="{46728522-0A0C-4B69-AA92-5B61FB9D1D81}" type="datetimeFigureOut">
               <a:rPr lang="es-MX" smtClean="0"/>
-              <a:t>09/10/2019</a:t>
+              <a:t>10/10/2019</a:t>
             </a:fld>
             <a:endParaRPr lang="es-MX"/>
           </a:p>
@@ -2094,7 +2100,7 @@
           <a:p>
             <a:fld id="{46728522-0A0C-4B69-AA92-5B61FB9D1D81}" type="datetimeFigureOut">
               <a:rPr lang="es-MX" smtClean="0"/>
-              <a:t>09/10/2019</a:t>
+              <a:t>10/10/2019</a:t>
             </a:fld>
             <a:endParaRPr lang="es-MX"/>
           </a:p>
@@ -2407,7 +2413,7 @@
           <a:p>
             <a:fld id="{46728522-0A0C-4B69-AA92-5B61FB9D1D81}" type="datetimeFigureOut">
               <a:rPr lang="es-MX" smtClean="0"/>
-              <a:t>09/10/2019</a:t>
+              <a:t>10/10/2019</a:t>
             </a:fld>
             <a:endParaRPr lang="es-MX"/>
           </a:p>
@@ -2696,7 +2702,7 @@
           <a:p>
             <a:fld id="{46728522-0A0C-4B69-AA92-5B61FB9D1D81}" type="datetimeFigureOut">
               <a:rPr lang="es-MX" smtClean="0"/>
-              <a:t>09/10/2019</a:t>
+              <a:t>10/10/2019</a:t>
             </a:fld>
             <a:endParaRPr lang="es-MX"/>
           </a:p>
@@ -2939,7 +2945,7 @@
           <a:p>
             <a:fld id="{46728522-0A0C-4B69-AA92-5B61FB9D1D81}" type="datetimeFigureOut">
               <a:rPr lang="es-MX" smtClean="0"/>
-              <a:t>09/10/2019</a:t>
+              <a:t>10/10/2019</a:t>
             </a:fld>
             <a:endParaRPr lang="es-MX"/>
           </a:p>
@@ -3498,15 +3504,7 @@
             <a:pPr algn="ctr"/>
             <a:r>
               <a:rPr lang="es-MX" dirty="0"/>
-              <a:t>Separar los puntos de ruta en </a:t>
-            </a:r>
-            <a:r>
-              <a:rPr lang="es-MX" dirty="0" err="1"/>
-              <a:t>x,y</a:t>
-            </a:r>
-            <a:r>
-              <a:rPr lang="es-MX" dirty="0"/>
-              <a:t>.</a:t>
+              <a:t>Separar los puntos de ruta en “x”, “y”.</a:t>
             </a:r>
           </a:p>
         </p:txBody>
@@ -3604,7 +3602,7 @@
             <a:pPr algn="ctr"/>
             <a:r>
               <a:rPr lang="es-MX" dirty="0"/>
-              <a:t>Elige los puntos con la separación acorde para seguirlos.</a:t>
+              <a:t>Elegir los puntos con la separación acorde para seguirlos.</a:t>
             </a:r>
           </a:p>
         </p:txBody>
@@ -3653,7 +3651,7 @@
             <a:pPr algn="ctr"/>
             <a:r>
               <a:rPr lang="es-MX" dirty="0"/>
-              <a:t>Obtiene el árbol KD a través de los puntos ya procesados.</a:t>
+              <a:t>Obtener el árbol KD a través de los puntos ya procesados.</a:t>
             </a:r>
           </a:p>
         </p:txBody>
@@ -3702,7 +3700,7 @@
             <a:pPr algn="ctr"/>
             <a:r>
               <a:rPr lang="es-MX" dirty="0"/>
-              <a:t>Guarda y muestra la trayectoria en pantalla.</a:t>
+              <a:t>Guardar y mostrar la trayectoria en pantalla.</a:t>
             </a:r>
           </a:p>
         </p:txBody>
@@ -3758,55 +3756,6 @@
       </p:sp>
       <p:sp>
         <p:nvSpPr>
-          <p:cNvPr id="19" name="Rectángulo 18">
-            <a:extLst>
-              <a:ext uri="{FF2B5EF4-FFF2-40B4-BE49-F238E27FC236}">
-                <a16:creationId xmlns:a16="http://schemas.microsoft.com/office/drawing/2014/main" id="{1492CA69-A56F-4119-B39C-7840AA7ED31E}"/>
-              </a:ext>
-            </a:extLst>
-          </p:cNvPr>
-          <p:cNvSpPr/>
-          <p:nvPr/>
-        </p:nvSpPr>
-        <p:spPr>
-          <a:xfrm>
-            <a:off x="3637723" y="5142946"/>
-            <a:ext cx="2411896" cy="874643"/>
-          </a:xfrm>
-          <a:prstGeom prst="rect">
-            <a:avLst/>
-          </a:prstGeom>
-        </p:spPr>
-        <p:style>
-          <a:lnRef idx="2">
-            <a:schemeClr val="accent1">
-              <a:shade val="50000"/>
-            </a:schemeClr>
-          </a:lnRef>
-          <a:fillRef idx="1">
-            <a:schemeClr val="accent1"/>
-          </a:fillRef>
-          <a:effectRef idx="0">
-            <a:schemeClr val="accent1"/>
-          </a:effectRef>
-          <a:fontRef idx="minor">
-            <a:schemeClr val="lt1"/>
-          </a:fontRef>
-        </p:style>
-        <p:txBody>
-          <a:bodyPr rtlCol="0" anchor="ctr"/>
-          <a:lstStyle/>
-          <a:p>
-            <a:pPr algn="ctr"/>
-            <a:r>
-              <a:rPr lang="es-MX" dirty="0"/>
-              <a:t>Para cada celda obtener el vecino más cercano.</a:t>
-            </a:r>
-          </a:p>
-        </p:txBody>
-      </p:sp>
-      <p:sp>
-        <p:nvSpPr>
           <p:cNvPr id="20" name="Rectángulo 19">
             <a:extLst>
               <a:ext uri="{FF2B5EF4-FFF2-40B4-BE49-F238E27FC236}">
@@ -3819,7 +3768,7 @@
         </p:nvSpPr>
         <p:spPr>
           <a:xfrm>
-            <a:off x="6526697" y="1888435"/>
+            <a:off x="3684104" y="5188226"/>
             <a:ext cx="2411896" cy="1080053"/>
           </a:xfrm>
           <a:prstGeom prst="rect">
@@ -3849,7 +3798,7 @@
             <a:pPr algn="ctr"/>
             <a:r>
               <a:rPr lang="es-MX" dirty="0"/>
-              <a:t>Para cada celda obtenida ejecuta el método </a:t>
+              <a:t>Para cada celda obtenida ejecutar el método </a:t>
             </a:r>
             <a:r>
               <a:rPr lang="es-MX" dirty="0" err="1"/>
@@ -3876,7 +3825,7 @@
         </p:nvSpPr>
         <p:spPr>
           <a:xfrm>
-            <a:off x="6526697" y="3233530"/>
+            <a:off x="6480316" y="1908311"/>
             <a:ext cx="2411896" cy="1080053"/>
           </a:xfrm>
           <a:prstGeom prst="rect">
@@ -3906,7 +3855,7 @@
             <a:pPr algn="ctr"/>
             <a:r>
               <a:rPr lang="es-MX" dirty="0"/>
-              <a:t>Guarda la Matriz en un archivo con extensión .</a:t>
+              <a:t>Guardar la matriz en un archivo con extensión .</a:t>
             </a:r>
             <a:r>
               <a:rPr lang="es-MX" dirty="0" err="1"/>
@@ -3921,7 +3870,7 @@
       </p:sp>
       <p:sp>
         <p:nvSpPr>
-          <p:cNvPr id="24" name="Rectángulo 23">
+          <p:cNvPr id="24" name="Diagrama de flujo: terminador 23">
             <a:extLst>
               <a:ext uri="{FF2B5EF4-FFF2-40B4-BE49-F238E27FC236}">
                 <a16:creationId xmlns:a16="http://schemas.microsoft.com/office/drawing/2014/main" id="{2E6056DA-597B-47DF-A43F-1F9EA5DC63C1}"/>
@@ -3933,10 +3882,10 @@
         </p:nvSpPr>
         <p:spPr>
           <a:xfrm>
-            <a:off x="6480316" y="4576733"/>
+            <a:off x="6480316" y="3329610"/>
             <a:ext cx="2411896" cy="1080053"/>
           </a:xfrm>
-          <a:prstGeom prst="rect">
+          <a:prstGeom prst="flowChartTerminator">
             <a:avLst/>
           </a:prstGeom>
         </p:spPr>
@@ -4141,7 +4090,7 @@
             <a:pPr algn="ctr"/>
             <a:r>
               <a:rPr lang="es-MX" dirty="0"/>
-              <a:t>Obtener la posición mas antigua de la lista.</a:t>
+              <a:t>Obtener la posición más antigua de la lista.</a:t>
             </a:r>
           </a:p>
         </p:txBody>
@@ -4225,7 +4174,7 @@
             <a:pPr algn="ctr"/>
             <a:r>
               <a:rPr lang="es-MX" dirty="0"/>
-              <a:t>Parar al líder  y regresar al programa principal.</a:t>
+              <a:t>Parar al líder y regresar al programa principal.</a:t>
             </a:r>
           </a:p>
         </p:txBody>
@@ -4274,7 +4223,7 @@
             <a:pPr algn="ctr"/>
             <a:r>
               <a:rPr lang="es-MX" dirty="0"/>
-              <a:t>¿Hay mas de 60 puntos en la lista?</a:t>
+              <a:t>¿Hay más de 60 puntos en la lista?</a:t>
             </a:r>
           </a:p>
         </p:txBody>
@@ -4485,7 +4434,7 @@
             <a:pPr algn="ctr"/>
             <a:r>
               <a:rPr lang="es-MX" dirty="0"/>
-              <a:t>Regreso al programa.</a:t>
+              <a:t>Regresar al programa.</a:t>
             </a:r>
           </a:p>
         </p:txBody>
@@ -4583,7 +4532,7 @@
             <a:pPr algn="ctr"/>
             <a:r>
               <a:rPr lang="es-MX" dirty="0"/>
-              <a:t>Calcula la diferencia angular entre las 2 posiciones seleccionando el ángulo de giro mas corto.</a:t>
+              <a:t>Calcular la diferencia angular entre las 2 posiciones seleccionando el ángulo de giro mas corto.</a:t>
             </a:r>
           </a:p>
         </p:txBody>
@@ -4716,7 +4665,7 @@
             <a:pPr algn="ctr"/>
             <a:r>
               <a:rPr lang="es-MX" dirty="0"/>
-              <a:t>Define la velocidad lineal de cero.</a:t>
+              <a:t>Definir la velocidad lineal de cero.</a:t>
             </a:r>
           </a:p>
         </p:txBody>
@@ -4800,7 +4749,7 @@
             <a:pPr algn="ctr"/>
             <a:r>
               <a:rPr lang="es-MX" dirty="0"/>
-              <a:t>Define la velocidad lineal propuesta.</a:t>
+              <a:t>Definir la velocidad lineal propuesta.</a:t>
             </a:r>
           </a:p>
         </p:txBody>
@@ -4849,7 +4798,7 @@
             <a:pPr algn="ctr"/>
             <a:r>
               <a:rPr lang="es-MX" dirty="0"/>
-              <a:t>Propone la velocidad angular proporcional al ángulo, ajustándolo a los límites de velocidad del móvil.</a:t>
+              <a:t>Proponer la velocidad angular proporcional al ángulo, ajustándolo a los límites de velocidad del móvil.</a:t>
             </a:r>
           </a:p>
         </p:txBody>
@@ -4898,7 +4847,7 @@
             <a:pPr algn="ctr"/>
             <a:r>
               <a:rPr lang="es-MX" dirty="0"/>
-              <a:t>Publica la velocidad al robot seguidor para que avance.</a:t>
+              <a:t>Publicar la velocidad al robot seguidor para que avance.</a:t>
             </a:r>
           </a:p>
         </p:txBody>
@@ -4947,7 +4896,7 @@
             <a:pPr algn="ctr"/>
             <a:r>
               <a:rPr lang="es-MX" dirty="0"/>
-              <a:t>Elimina la posición mas antigua de la lista.</a:t>
+              <a:t>Elimina la posición más antigua de la lista.</a:t>
             </a:r>
           </a:p>
         </p:txBody>
@@ -4956,6 +4905,2939 @@
     <p:extLst>
       <p:ext uri="{BB962C8B-B14F-4D97-AF65-F5344CB8AC3E}">
         <p14:creationId xmlns:p14="http://schemas.microsoft.com/office/powerpoint/2010/main" val="3245682026"/>
+      </p:ext>
+    </p:extLst>
+  </p:cSld>
+  <p:clrMapOvr>
+    <a:masterClrMapping/>
+  </p:clrMapOvr>
+</p:sld>
+</file>
+
+<file path=ppt/slides/slide11.xml><?xml version="1.0" encoding="utf-8"?>
+<p:sld xmlns:a="http://schemas.openxmlformats.org/drawingml/2006/main" xmlns:r="http://schemas.openxmlformats.org/officeDocument/2006/relationships" xmlns:p="http://schemas.openxmlformats.org/presentationml/2006/main">
+  <p:cSld>
+    <p:spTree>
+      <p:nvGrpSpPr>
+        <p:cNvPr id="1" name=""/>
+        <p:cNvGrpSpPr/>
+        <p:nvPr/>
+      </p:nvGrpSpPr>
+      <p:grpSpPr>
+        <a:xfrm>
+          <a:off x="0" y="0"/>
+          <a:ext cx="0" cy="0"/>
+          <a:chOff x="0" y="0"/>
+          <a:chExt cx="0" cy="0"/>
+        </a:xfrm>
+      </p:grpSpPr>
+      <p:sp>
+        <p:nvSpPr>
+          <p:cNvPr id="4" name="Rectángulo 3">
+            <a:extLst>
+              <a:ext uri="{FF2B5EF4-FFF2-40B4-BE49-F238E27FC236}">
+                <a16:creationId xmlns:a16="http://schemas.microsoft.com/office/drawing/2014/main" id="{89FDC41C-B80C-4A5A-85FE-2C1798ED01B1}"/>
+              </a:ext>
+            </a:extLst>
+          </p:cNvPr>
+          <p:cNvSpPr/>
+          <p:nvPr/>
+        </p:nvSpPr>
+        <p:spPr>
+          <a:xfrm>
+            <a:off x="424073" y="325779"/>
+            <a:ext cx="2928727" cy="2099921"/>
+          </a:xfrm>
+          <a:prstGeom prst="rect">
+            <a:avLst/>
+          </a:prstGeom>
+        </p:spPr>
+        <p:style>
+          <a:lnRef idx="2">
+            <a:schemeClr val="accent1">
+              <a:shade val="50000"/>
+            </a:schemeClr>
+          </a:lnRef>
+          <a:fillRef idx="1">
+            <a:schemeClr val="accent1"/>
+          </a:fillRef>
+          <a:effectRef idx="0">
+            <a:schemeClr val="accent1"/>
+          </a:effectRef>
+          <a:fontRef idx="minor">
+            <a:schemeClr val="lt1"/>
+          </a:fontRef>
+        </p:style>
+        <p:txBody>
+          <a:bodyPr rtlCol="0" anchor="ctr"/>
+          <a:lstStyle/>
+          <a:p>
+            <a:pPr algn="ctr"/>
+            <a:r>
+              <a:rPr lang="es-MX" dirty="0" err="1"/>
+              <a:t>Obstacle</a:t>
+            </a:r>
+            <a:endParaRPr lang="es-MX" dirty="0"/>
+          </a:p>
+          <a:p>
+            <a:pPr algn="ctr"/>
+            <a:r>
+              <a:rPr lang="es-MX" dirty="0"/>
+              <a:t>_________________</a:t>
+            </a:r>
+          </a:p>
+          <a:p>
+            <a:pPr algn="ctr"/>
+            <a:r>
+              <a:rPr lang="es-MX" dirty="0"/>
+              <a:t>__</a:t>
+            </a:r>
+            <a:r>
+              <a:rPr lang="es-MX" dirty="0" err="1"/>
+              <a:t>init</a:t>
+            </a:r>
+            <a:r>
+              <a:rPr lang="es-MX" dirty="0"/>
+              <a:t>__(</a:t>
+            </a:r>
+            <a:r>
+              <a:rPr lang="es-MX" dirty="0" err="1"/>
+              <a:t>self</a:t>
+            </a:r>
+            <a:r>
+              <a:rPr lang="es-MX" dirty="0"/>
+              <a:t>)</a:t>
+            </a:r>
+          </a:p>
+          <a:p>
+            <a:pPr algn="ctr"/>
+            <a:r>
+              <a:rPr lang="es-MX" dirty="0" err="1"/>
+              <a:t>get_scan</a:t>
+            </a:r>
+            <a:r>
+              <a:rPr lang="es-MX" dirty="0"/>
+              <a:t>(</a:t>
+            </a:r>
+            <a:r>
+              <a:rPr lang="es-MX" dirty="0" err="1"/>
+              <a:t>self</a:t>
+            </a:r>
+            <a:r>
+              <a:rPr lang="es-MX" dirty="0"/>
+              <a:t>)</a:t>
+            </a:r>
+          </a:p>
+          <a:p>
+            <a:pPr algn="ctr"/>
+            <a:r>
+              <a:rPr lang="es-MX" dirty="0" err="1"/>
+              <a:t>obtain_min_distance</a:t>
+            </a:r>
+            <a:r>
+              <a:rPr lang="es-MX" dirty="0"/>
+              <a:t>(</a:t>
+            </a:r>
+            <a:r>
+              <a:rPr lang="es-MX" dirty="0" err="1"/>
+              <a:t>self</a:t>
+            </a:r>
+            <a:r>
+              <a:rPr lang="es-MX" dirty="0"/>
+              <a:t>)</a:t>
+            </a:r>
+          </a:p>
+        </p:txBody>
+      </p:sp>
+      <p:sp>
+        <p:nvSpPr>
+          <p:cNvPr id="6" name="Rectángulo 5">
+            <a:extLst>
+              <a:ext uri="{FF2B5EF4-FFF2-40B4-BE49-F238E27FC236}">
+                <a16:creationId xmlns:a16="http://schemas.microsoft.com/office/drawing/2014/main" id="{FB4145F7-410D-4130-BD24-AA1ACA7C588D}"/>
+              </a:ext>
+            </a:extLst>
+          </p:cNvPr>
+          <p:cNvSpPr/>
+          <p:nvPr/>
+        </p:nvSpPr>
+        <p:spPr>
+          <a:xfrm>
+            <a:off x="3684104" y="997697"/>
+            <a:ext cx="2411896" cy="756084"/>
+          </a:xfrm>
+          <a:prstGeom prst="rect">
+            <a:avLst/>
+          </a:prstGeom>
+        </p:spPr>
+        <p:style>
+          <a:lnRef idx="2">
+            <a:schemeClr val="accent1">
+              <a:shade val="50000"/>
+            </a:schemeClr>
+          </a:lnRef>
+          <a:fillRef idx="1">
+            <a:schemeClr val="accent1"/>
+          </a:fillRef>
+          <a:effectRef idx="0">
+            <a:schemeClr val="accent1"/>
+          </a:effectRef>
+          <a:fontRef idx="minor">
+            <a:schemeClr val="lt1"/>
+          </a:fontRef>
+        </p:style>
+        <p:txBody>
+          <a:bodyPr rtlCol="0" anchor="ctr"/>
+          <a:lstStyle/>
+          <a:p>
+            <a:pPr algn="ctr"/>
+            <a:r>
+              <a:rPr lang="es-MX" dirty="0"/>
+              <a:t>Publisher</a:t>
+            </a:r>
+          </a:p>
+        </p:txBody>
+      </p:sp>
+    </p:spTree>
+    <p:extLst>
+      <p:ext uri="{BB962C8B-B14F-4D97-AF65-F5344CB8AC3E}">
+        <p14:creationId xmlns:p14="http://schemas.microsoft.com/office/powerpoint/2010/main" val="3840984653"/>
+      </p:ext>
+    </p:extLst>
+  </p:cSld>
+  <p:clrMapOvr>
+    <a:masterClrMapping/>
+  </p:clrMapOvr>
+</p:sld>
+</file>
+
+<file path=ppt/slides/slide12.xml><?xml version="1.0" encoding="utf-8"?>
+<p:sld xmlns:a="http://schemas.openxmlformats.org/drawingml/2006/main" xmlns:r="http://schemas.openxmlformats.org/officeDocument/2006/relationships" xmlns:p="http://schemas.openxmlformats.org/presentationml/2006/main">
+  <p:cSld>
+    <p:spTree>
+      <p:nvGrpSpPr>
+        <p:cNvPr id="1" name=""/>
+        <p:cNvGrpSpPr/>
+        <p:nvPr/>
+      </p:nvGrpSpPr>
+      <p:grpSpPr>
+        <a:xfrm>
+          <a:off x="0" y="0"/>
+          <a:ext cx="0" cy="0"/>
+          <a:chOff x="0" y="0"/>
+          <a:chExt cx="0" cy="0"/>
+        </a:xfrm>
+      </p:grpSpPr>
+      <p:sp>
+        <p:nvSpPr>
+          <p:cNvPr id="4" name="Elipse 3">
+            <a:extLst>
+              <a:ext uri="{FF2B5EF4-FFF2-40B4-BE49-F238E27FC236}">
+                <a16:creationId xmlns:a16="http://schemas.microsoft.com/office/drawing/2014/main" id="{8A0CDFFF-D7BD-41C6-824E-5E7F39A20166}"/>
+              </a:ext>
+            </a:extLst>
+          </p:cNvPr>
+          <p:cNvSpPr/>
+          <p:nvPr/>
+        </p:nvSpPr>
+        <p:spPr>
+          <a:xfrm>
+            <a:off x="424621" y="217005"/>
+            <a:ext cx="2411896" cy="1113182"/>
+          </a:xfrm>
+          <a:prstGeom prst="ellipse">
+            <a:avLst/>
+          </a:prstGeom>
+        </p:spPr>
+        <p:style>
+          <a:lnRef idx="2">
+            <a:schemeClr val="accent1">
+              <a:shade val="50000"/>
+            </a:schemeClr>
+          </a:lnRef>
+          <a:fillRef idx="1">
+            <a:schemeClr val="accent1"/>
+          </a:fillRef>
+          <a:effectRef idx="0">
+            <a:schemeClr val="accent1"/>
+          </a:effectRef>
+          <a:fontRef idx="minor">
+            <a:schemeClr val="lt1"/>
+          </a:fontRef>
+        </p:style>
+        <p:txBody>
+          <a:bodyPr rtlCol="0" anchor="ctr"/>
+          <a:lstStyle/>
+          <a:p>
+            <a:pPr algn="ctr"/>
+            <a:r>
+              <a:rPr lang="es-MX" dirty="0"/>
+              <a:t>Inicio</a:t>
+            </a:r>
+          </a:p>
+        </p:txBody>
+      </p:sp>
+      <p:sp>
+        <p:nvSpPr>
+          <p:cNvPr id="5" name="Rectángulo 4">
+            <a:extLst>
+              <a:ext uri="{FF2B5EF4-FFF2-40B4-BE49-F238E27FC236}">
+                <a16:creationId xmlns:a16="http://schemas.microsoft.com/office/drawing/2014/main" id="{EF547F28-9F48-47FC-AC79-583D2DC3D94C}"/>
+              </a:ext>
+            </a:extLst>
+          </p:cNvPr>
+          <p:cNvSpPr/>
+          <p:nvPr/>
+        </p:nvSpPr>
+        <p:spPr>
+          <a:xfrm>
+            <a:off x="441738" y="1767508"/>
+            <a:ext cx="2411896" cy="874643"/>
+          </a:xfrm>
+          <a:prstGeom prst="rect">
+            <a:avLst/>
+          </a:prstGeom>
+        </p:spPr>
+        <p:style>
+          <a:lnRef idx="2">
+            <a:schemeClr val="accent1">
+              <a:shade val="50000"/>
+            </a:schemeClr>
+          </a:lnRef>
+          <a:fillRef idx="1">
+            <a:schemeClr val="accent1"/>
+          </a:fillRef>
+          <a:effectRef idx="0">
+            <a:schemeClr val="accent1"/>
+          </a:effectRef>
+          <a:fontRef idx="minor">
+            <a:schemeClr val="lt1"/>
+          </a:fontRef>
+        </p:style>
+        <p:txBody>
+          <a:bodyPr rtlCol="0" anchor="ctr"/>
+          <a:lstStyle/>
+          <a:p>
+            <a:pPr algn="ctr"/>
+            <a:r>
+              <a:rPr lang="es-MX" dirty="0"/>
+              <a:t>Inicializar el nodo </a:t>
+            </a:r>
+          </a:p>
+          <a:p>
+            <a:pPr algn="ctr"/>
+            <a:r>
+              <a:rPr lang="es-MX" dirty="0"/>
+              <a:t>“turtlebot3_distance”.</a:t>
+            </a:r>
+          </a:p>
+        </p:txBody>
+      </p:sp>
+      <p:sp>
+        <p:nvSpPr>
+          <p:cNvPr id="6" name="Rectángulo 5">
+            <a:extLst>
+              <a:ext uri="{FF2B5EF4-FFF2-40B4-BE49-F238E27FC236}">
+                <a16:creationId xmlns:a16="http://schemas.microsoft.com/office/drawing/2014/main" id="{C6950644-63DE-4D67-8687-1399F681EFD2}"/>
+              </a:ext>
+            </a:extLst>
+          </p:cNvPr>
+          <p:cNvSpPr/>
+          <p:nvPr/>
+        </p:nvSpPr>
+        <p:spPr>
+          <a:xfrm>
+            <a:off x="424621" y="2986710"/>
+            <a:ext cx="2411896" cy="874643"/>
+          </a:xfrm>
+          <a:prstGeom prst="rect">
+            <a:avLst/>
+          </a:prstGeom>
+        </p:spPr>
+        <p:style>
+          <a:lnRef idx="2">
+            <a:schemeClr val="accent1">
+              <a:shade val="50000"/>
+            </a:schemeClr>
+          </a:lnRef>
+          <a:fillRef idx="1">
+            <a:schemeClr val="accent1"/>
+          </a:fillRef>
+          <a:effectRef idx="0">
+            <a:schemeClr val="accent1"/>
+          </a:effectRef>
+          <a:fontRef idx="minor">
+            <a:schemeClr val="lt1"/>
+          </a:fontRef>
+        </p:style>
+        <p:txBody>
+          <a:bodyPr rtlCol="0" anchor="ctr"/>
+          <a:lstStyle/>
+          <a:p>
+            <a:pPr algn="ctr"/>
+            <a:r>
+              <a:rPr lang="es-MX" dirty="0"/>
+              <a:t>Construir el objeto “</a:t>
+            </a:r>
+            <a:r>
+              <a:rPr lang="es-MX" dirty="0" err="1"/>
+              <a:t>Obstacle</a:t>
+            </a:r>
+            <a:r>
+              <a:rPr lang="es-MX" dirty="0"/>
+              <a:t>”.</a:t>
+            </a:r>
+          </a:p>
+        </p:txBody>
+      </p:sp>
+      <p:sp>
+        <p:nvSpPr>
+          <p:cNvPr id="7" name="Rectángulo 6">
+            <a:extLst>
+              <a:ext uri="{FF2B5EF4-FFF2-40B4-BE49-F238E27FC236}">
+                <a16:creationId xmlns:a16="http://schemas.microsoft.com/office/drawing/2014/main" id="{0EF1B095-F210-4A79-B578-F84D6DECE908}"/>
+              </a:ext>
+            </a:extLst>
+          </p:cNvPr>
+          <p:cNvSpPr/>
+          <p:nvPr/>
+        </p:nvSpPr>
+        <p:spPr>
+          <a:xfrm>
+            <a:off x="6054574" y="1767508"/>
+            <a:ext cx="2411896" cy="874643"/>
+          </a:xfrm>
+          <a:prstGeom prst="rect">
+            <a:avLst/>
+          </a:prstGeom>
+        </p:spPr>
+        <p:style>
+          <a:lnRef idx="2">
+            <a:schemeClr val="accent1">
+              <a:shade val="50000"/>
+            </a:schemeClr>
+          </a:lnRef>
+          <a:fillRef idx="1">
+            <a:schemeClr val="accent1"/>
+          </a:fillRef>
+          <a:effectRef idx="0">
+            <a:schemeClr val="accent1"/>
+          </a:effectRef>
+          <a:fontRef idx="minor">
+            <a:schemeClr val="lt1"/>
+          </a:fontRef>
+        </p:style>
+        <p:txBody>
+          <a:bodyPr rtlCol="0" anchor="ctr"/>
+          <a:lstStyle/>
+          <a:p>
+            <a:pPr algn="ctr"/>
+            <a:r>
+              <a:rPr lang="es-MX" dirty="0"/>
+              <a:t>¿Esta ROS ejecutándose?</a:t>
+            </a:r>
+          </a:p>
+        </p:txBody>
+      </p:sp>
+      <p:sp>
+        <p:nvSpPr>
+          <p:cNvPr id="8" name="Elipse 7">
+            <a:extLst>
+              <a:ext uri="{FF2B5EF4-FFF2-40B4-BE49-F238E27FC236}">
+                <a16:creationId xmlns:a16="http://schemas.microsoft.com/office/drawing/2014/main" id="{E0ABF3A9-50EA-4A46-A212-DD51D1EBE486}"/>
+              </a:ext>
+            </a:extLst>
+          </p:cNvPr>
+          <p:cNvSpPr/>
+          <p:nvPr/>
+        </p:nvSpPr>
+        <p:spPr>
+          <a:xfrm>
+            <a:off x="441738" y="4133022"/>
+            <a:ext cx="2411896" cy="1113182"/>
+          </a:xfrm>
+          <a:prstGeom prst="ellipse">
+            <a:avLst/>
+          </a:prstGeom>
+        </p:spPr>
+        <p:style>
+          <a:lnRef idx="2">
+            <a:schemeClr val="accent1">
+              <a:shade val="50000"/>
+            </a:schemeClr>
+          </a:lnRef>
+          <a:fillRef idx="1">
+            <a:schemeClr val="accent1"/>
+          </a:fillRef>
+          <a:effectRef idx="0">
+            <a:schemeClr val="accent1"/>
+          </a:effectRef>
+          <a:fontRef idx="minor">
+            <a:schemeClr val="lt1"/>
+          </a:fontRef>
+        </p:style>
+        <p:txBody>
+          <a:bodyPr rtlCol="0" anchor="ctr"/>
+          <a:lstStyle/>
+          <a:p>
+            <a:pPr algn="ctr"/>
+            <a:r>
+              <a:rPr lang="es-MX" dirty="0"/>
+              <a:t>FIN</a:t>
+            </a:r>
+          </a:p>
+        </p:txBody>
+      </p:sp>
+      <p:sp>
+        <p:nvSpPr>
+          <p:cNvPr id="9" name="CuadroTexto 8">
+            <a:extLst>
+              <a:ext uri="{FF2B5EF4-FFF2-40B4-BE49-F238E27FC236}">
+                <a16:creationId xmlns:a16="http://schemas.microsoft.com/office/drawing/2014/main" id="{B1940B23-DDCA-4811-8E5B-FB8CB3DC489E}"/>
+              </a:ext>
+            </a:extLst>
+          </p:cNvPr>
+          <p:cNvSpPr txBox="1"/>
+          <p:nvPr/>
+        </p:nvSpPr>
+        <p:spPr>
+          <a:xfrm>
+            <a:off x="7088701" y="2735316"/>
+            <a:ext cx="664842" cy="369332"/>
+          </a:xfrm>
+          <a:prstGeom prst="rect">
+            <a:avLst/>
+          </a:prstGeom>
+          <a:noFill/>
+        </p:spPr>
+        <p:txBody>
+          <a:bodyPr wrap="square" rtlCol="0">
+            <a:spAutoFit/>
+          </a:bodyPr>
+          <a:lstStyle/>
+          <a:p>
+            <a:r>
+              <a:rPr lang="es-MX" dirty="0"/>
+              <a:t>Si</a:t>
+            </a:r>
+          </a:p>
+        </p:txBody>
+      </p:sp>
+      <p:sp>
+        <p:nvSpPr>
+          <p:cNvPr id="10" name="CuadroTexto 9">
+            <a:extLst>
+              <a:ext uri="{FF2B5EF4-FFF2-40B4-BE49-F238E27FC236}">
+                <a16:creationId xmlns:a16="http://schemas.microsoft.com/office/drawing/2014/main" id="{AD7F4633-C228-43D4-8C3D-29E9D5B24E21}"/>
+              </a:ext>
+            </a:extLst>
+          </p:cNvPr>
+          <p:cNvSpPr txBox="1"/>
+          <p:nvPr/>
+        </p:nvSpPr>
+        <p:spPr>
+          <a:xfrm>
+            <a:off x="8537167" y="2020163"/>
+            <a:ext cx="455574" cy="369332"/>
+          </a:xfrm>
+          <a:prstGeom prst="rect">
+            <a:avLst/>
+          </a:prstGeom>
+          <a:noFill/>
+        </p:spPr>
+        <p:txBody>
+          <a:bodyPr wrap="none" rtlCol="0">
+            <a:spAutoFit/>
+          </a:bodyPr>
+          <a:lstStyle/>
+          <a:p>
+            <a:r>
+              <a:rPr lang="es-MX" dirty="0"/>
+              <a:t>No</a:t>
+            </a:r>
+          </a:p>
+        </p:txBody>
+      </p:sp>
+      <p:cxnSp>
+        <p:nvCxnSpPr>
+          <p:cNvPr id="12" name="Conector recto 11">
+            <a:extLst>
+              <a:ext uri="{FF2B5EF4-FFF2-40B4-BE49-F238E27FC236}">
+                <a16:creationId xmlns:a16="http://schemas.microsoft.com/office/drawing/2014/main" id="{1716C8E9-BF98-4F39-B5BF-5B047132C4F6}"/>
+              </a:ext>
+            </a:extLst>
+          </p:cNvPr>
+          <p:cNvCxnSpPr>
+            <a:cxnSpLocks/>
+            <a:stCxn id="21" idx="2"/>
+          </p:cNvCxnSpPr>
+          <p:nvPr/>
+        </p:nvCxnSpPr>
+        <p:spPr>
+          <a:xfrm>
+            <a:off x="7260522" y="1210917"/>
+            <a:ext cx="0" cy="559903"/>
+          </a:xfrm>
+          <a:prstGeom prst="line">
+            <a:avLst/>
+          </a:prstGeom>
+        </p:spPr>
+        <p:style>
+          <a:lnRef idx="1">
+            <a:schemeClr val="accent1"/>
+          </a:lnRef>
+          <a:fillRef idx="0">
+            <a:schemeClr val="accent1"/>
+          </a:fillRef>
+          <a:effectRef idx="0">
+            <a:schemeClr val="accent1"/>
+          </a:effectRef>
+          <a:fontRef idx="minor">
+            <a:schemeClr val="tx1"/>
+          </a:fontRef>
+        </p:style>
+      </p:cxnSp>
+      <p:sp>
+        <p:nvSpPr>
+          <p:cNvPr id="13" name="Rectángulo 12">
+            <a:extLst>
+              <a:ext uri="{FF2B5EF4-FFF2-40B4-BE49-F238E27FC236}">
+                <a16:creationId xmlns:a16="http://schemas.microsoft.com/office/drawing/2014/main" id="{E6289C9B-52FC-47EF-A7C7-2BBA0D26ECE1}"/>
+              </a:ext>
+            </a:extLst>
+          </p:cNvPr>
+          <p:cNvSpPr/>
+          <p:nvPr/>
+        </p:nvSpPr>
+        <p:spPr>
+          <a:xfrm>
+            <a:off x="3250578" y="1767508"/>
+            <a:ext cx="2411896" cy="874643"/>
+          </a:xfrm>
+          <a:prstGeom prst="rect">
+            <a:avLst/>
+          </a:prstGeom>
+        </p:spPr>
+        <p:style>
+          <a:lnRef idx="2">
+            <a:schemeClr val="accent1">
+              <a:shade val="50000"/>
+            </a:schemeClr>
+          </a:lnRef>
+          <a:fillRef idx="1">
+            <a:schemeClr val="accent1"/>
+          </a:fillRef>
+          <a:effectRef idx="0">
+            <a:schemeClr val="accent1"/>
+          </a:effectRef>
+          <a:fontRef idx="minor">
+            <a:schemeClr val="lt1"/>
+          </a:fontRef>
+        </p:style>
+        <p:txBody>
+          <a:bodyPr rtlCol="0" anchor="ctr"/>
+          <a:lstStyle/>
+          <a:p>
+            <a:pPr algn="ctr"/>
+            <a:r>
+              <a:rPr lang="es-MX" dirty="0"/>
+              <a:t>Definir límites de error y de tiempo de muestreo.</a:t>
+            </a:r>
+          </a:p>
+        </p:txBody>
+      </p:sp>
+      <p:cxnSp>
+        <p:nvCxnSpPr>
+          <p:cNvPr id="14" name="Conector recto 13">
+            <a:extLst>
+              <a:ext uri="{FF2B5EF4-FFF2-40B4-BE49-F238E27FC236}">
+                <a16:creationId xmlns:a16="http://schemas.microsoft.com/office/drawing/2014/main" id="{F7429582-A6E7-4F43-838E-A491D367BE60}"/>
+              </a:ext>
+            </a:extLst>
+          </p:cNvPr>
+          <p:cNvCxnSpPr>
+            <a:cxnSpLocks/>
+            <a:endCxn id="8" idx="0"/>
+          </p:cNvCxnSpPr>
+          <p:nvPr/>
+        </p:nvCxnSpPr>
+        <p:spPr>
+          <a:xfrm>
+            <a:off x="1647686" y="3611223"/>
+            <a:ext cx="0" cy="521799"/>
+          </a:xfrm>
+          <a:prstGeom prst="line">
+            <a:avLst/>
+          </a:prstGeom>
+        </p:spPr>
+        <p:style>
+          <a:lnRef idx="1">
+            <a:schemeClr val="accent1"/>
+          </a:lnRef>
+          <a:fillRef idx="0">
+            <a:schemeClr val="accent1"/>
+          </a:fillRef>
+          <a:effectRef idx="0">
+            <a:schemeClr val="accent1"/>
+          </a:effectRef>
+          <a:fontRef idx="minor">
+            <a:schemeClr val="tx1"/>
+          </a:fontRef>
+        </p:style>
+      </p:cxnSp>
+      <p:sp>
+        <p:nvSpPr>
+          <p:cNvPr id="16" name="Rectángulo 15">
+            <a:extLst>
+              <a:ext uri="{FF2B5EF4-FFF2-40B4-BE49-F238E27FC236}">
+                <a16:creationId xmlns:a16="http://schemas.microsoft.com/office/drawing/2014/main" id="{6C04F0C5-5D84-4BFF-8686-6D7AE63041F4}"/>
+              </a:ext>
+            </a:extLst>
+          </p:cNvPr>
+          <p:cNvSpPr/>
+          <p:nvPr/>
+        </p:nvSpPr>
+        <p:spPr>
+          <a:xfrm>
+            <a:off x="3250578" y="352210"/>
+            <a:ext cx="2411896" cy="874643"/>
+          </a:xfrm>
+          <a:prstGeom prst="rect">
+            <a:avLst/>
+          </a:prstGeom>
+        </p:spPr>
+        <p:style>
+          <a:lnRef idx="2">
+            <a:schemeClr val="accent1">
+              <a:shade val="50000"/>
+            </a:schemeClr>
+          </a:lnRef>
+          <a:fillRef idx="1">
+            <a:schemeClr val="accent1"/>
+          </a:fillRef>
+          <a:effectRef idx="0">
+            <a:schemeClr val="accent1"/>
+          </a:effectRef>
+          <a:fontRef idx="minor">
+            <a:schemeClr val="lt1"/>
+          </a:fontRef>
+        </p:style>
+        <p:txBody>
+          <a:bodyPr rtlCol="0" anchor="ctr"/>
+          <a:lstStyle/>
+          <a:p>
+            <a:pPr algn="ctr"/>
+            <a:r>
+              <a:rPr lang="es-MX" dirty="0"/>
+              <a:t>__</a:t>
+            </a:r>
+            <a:r>
+              <a:rPr lang="es-MX" dirty="0" err="1"/>
+              <a:t>init</a:t>
+            </a:r>
+            <a:r>
+              <a:rPr lang="es-MX" dirty="0"/>
+              <a:t>__</a:t>
+            </a:r>
+          </a:p>
+        </p:txBody>
+      </p:sp>
+      <p:sp>
+        <p:nvSpPr>
+          <p:cNvPr id="17" name="Rectángulo 16">
+            <a:extLst>
+              <a:ext uri="{FF2B5EF4-FFF2-40B4-BE49-F238E27FC236}">
+                <a16:creationId xmlns:a16="http://schemas.microsoft.com/office/drawing/2014/main" id="{4C1CB294-6FC6-407E-88ED-9FF6709781A8}"/>
+              </a:ext>
+            </a:extLst>
+          </p:cNvPr>
+          <p:cNvSpPr/>
+          <p:nvPr/>
+        </p:nvSpPr>
+        <p:spPr>
+          <a:xfrm>
+            <a:off x="3250578" y="2986710"/>
+            <a:ext cx="2411896" cy="874643"/>
+          </a:xfrm>
+          <a:prstGeom prst="rect">
+            <a:avLst/>
+          </a:prstGeom>
+        </p:spPr>
+        <p:style>
+          <a:lnRef idx="2">
+            <a:schemeClr val="accent1">
+              <a:shade val="50000"/>
+            </a:schemeClr>
+          </a:lnRef>
+          <a:fillRef idx="1">
+            <a:schemeClr val="accent1"/>
+          </a:fillRef>
+          <a:effectRef idx="0">
+            <a:schemeClr val="accent1"/>
+          </a:effectRef>
+          <a:fontRef idx="minor">
+            <a:schemeClr val="lt1"/>
+          </a:fontRef>
+        </p:style>
+        <p:txBody>
+          <a:bodyPr rtlCol="0" anchor="ctr"/>
+          <a:lstStyle/>
+          <a:p>
+            <a:pPr algn="ctr"/>
+            <a:r>
+              <a:rPr lang="es-MX" dirty="0"/>
+              <a:t>Ejecutar el método </a:t>
+            </a:r>
+            <a:r>
+              <a:rPr lang="es-MX" dirty="0" err="1"/>
+              <a:t>obtain_min_distance</a:t>
+            </a:r>
+            <a:r>
+              <a:rPr lang="es-MX" dirty="0"/>
+              <a:t>.</a:t>
+            </a:r>
+          </a:p>
+        </p:txBody>
+      </p:sp>
+      <p:sp>
+        <p:nvSpPr>
+          <p:cNvPr id="18" name="Rectángulo 17">
+            <a:extLst>
+              <a:ext uri="{FF2B5EF4-FFF2-40B4-BE49-F238E27FC236}">
+                <a16:creationId xmlns:a16="http://schemas.microsoft.com/office/drawing/2014/main" id="{1D7A7C05-F8F7-41A7-96E8-E66CB6DE9D9E}"/>
+              </a:ext>
+            </a:extLst>
+          </p:cNvPr>
+          <p:cNvSpPr/>
+          <p:nvPr/>
+        </p:nvSpPr>
+        <p:spPr>
+          <a:xfrm>
+            <a:off x="3250578" y="4286681"/>
+            <a:ext cx="2411896" cy="874643"/>
+          </a:xfrm>
+          <a:prstGeom prst="rect">
+            <a:avLst/>
+          </a:prstGeom>
+        </p:spPr>
+        <p:style>
+          <a:lnRef idx="2">
+            <a:schemeClr val="accent1">
+              <a:shade val="50000"/>
+            </a:schemeClr>
+          </a:lnRef>
+          <a:fillRef idx="1">
+            <a:schemeClr val="accent1"/>
+          </a:fillRef>
+          <a:effectRef idx="0">
+            <a:schemeClr val="accent1"/>
+          </a:effectRef>
+          <a:fontRef idx="minor">
+            <a:schemeClr val="lt1"/>
+          </a:fontRef>
+        </p:style>
+        <p:txBody>
+          <a:bodyPr rtlCol="0" anchor="ctr"/>
+          <a:lstStyle/>
+          <a:p>
+            <a:pPr algn="ctr"/>
+            <a:r>
+              <a:rPr lang="es-MX" dirty="0"/>
+              <a:t>Regresar al programa.</a:t>
+            </a:r>
+          </a:p>
+        </p:txBody>
+      </p:sp>
+      <p:sp>
+        <p:nvSpPr>
+          <p:cNvPr id="21" name="Rectángulo 20">
+            <a:extLst>
+              <a:ext uri="{FF2B5EF4-FFF2-40B4-BE49-F238E27FC236}">
+                <a16:creationId xmlns:a16="http://schemas.microsoft.com/office/drawing/2014/main" id="{4FAECDE4-C5B9-4F11-8F17-7313F769A5D3}"/>
+              </a:ext>
+            </a:extLst>
+          </p:cNvPr>
+          <p:cNvSpPr/>
+          <p:nvPr/>
+        </p:nvSpPr>
+        <p:spPr>
+          <a:xfrm>
+            <a:off x="6054574" y="336274"/>
+            <a:ext cx="2411896" cy="874643"/>
+          </a:xfrm>
+          <a:prstGeom prst="rect">
+            <a:avLst/>
+          </a:prstGeom>
+        </p:spPr>
+        <p:style>
+          <a:lnRef idx="2">
+            <a:schemeClr val="accent1">
+              <a:shade val="50000"/>
+            </a:schemeClr>
+          </a:lnRef>
+          <a:fillRef idx="1">
+            <a:schemeClr val="accent1"/>
+          </a:fillRef>
+          <a:effectRef idx="0">
+            <a:schemeClr val="accent1"/>
+          </a:effectRef>
+          <a:fontRef idx="minor">
+            <a:schemeClr val="lt1"/>
+          </a:fontRef>
+        </p:style>
+        <p:txBody>
+          <a:bodyPr rtlCol="0" anchor="ctr"/>
+          <a:lstStyle/>
+          <a:p>
+            <a:pPr algn="ctr"/>
+            <a:r>
+              <a:rPr lang="es-MX" dirty="0" err="1"/>
+              <a:t>obtain_min_distance</a:t>
+            </a:r>
+            <a:endParaRPr lang="es-MX" dirty="0"/>
+          </a:p>
+        </p:txBody>
+      </p:sp>
+      <p:cxnSp>
+        <p:nvCxnSpPr>
+          <p:cNvPr id="22" name="Conector recto de flecha 21">
+            <a:extLst>
+              <a:ext uri="{FF2B5EF4-FFF2-40B4-BE49-F238E27FC236}">
+                <a16:creationId xmlns:a16="http://schemas.microsoft.com/office/drawing/2014/main" id="{508AF149-28C8-487F-A3C9-EF8C628E6F3C}"/>
+              </a:ext>
+            </a:extLst>
+          </p:cNvPr>
+          <p:cNvCxnSpPr>
+            <a:cxnSpLocks/>
+            <a:endCxn id="23" idx="1"/>
+          </p:cNvCxnSpPr>
+          <p:nvPr/>
+        </p:nvCxnSpPr>
+        <p:spPr>
+          <a:xfrm>
+            <a:off x="8834597" y="2204830"/>
+            <a:ext cx="228841" cy="0"/>
+          </a:xfrm>
+          <a:prstGeom prst="straightConnector1">
+            <a:avLst/>
+          </a:prstGeom>
+          <a:ln>
+            <a:tailEnd type="triangle"/>
+          </a:ln>
+        </p:spPr>
+        <p:style>
+          <a:lnRef idx="1">
+            <a:schemeClr val="accent1"/>
+          </a:lnRef>
+          <a:fillRef idx="0">
+            <a:schemeClr val="accent1"/>
+          </a:fillRef>
+          <a:effectRef idx="0">
+            <a:schemeClr val="accent1"/>
+          </a:effectRef>
+          <a:fontRef idx="minor">
+            <a:schemeClr val="tx1"/>
+          </a:fontRef>
+        </p:style>
+      </p:cxnSp>
+      <p:sp>
+        <p:nvSpPr>
+          <p:cNvPr id="23" name="Rectángulo 22">
+            <a:extLst>
+              <a:ext uri="{FF2B5EF4-FFF2-40B4-BE49-F238E27FC236}">
+                <a16:creationId xmlns:a16="http://schemas.microsoft.com/office/drawing/2014/main" id="{52401543-C856-42E9-9E87-7FCBFFDFB2C2}"/>
+              </a:ext>
+            </a:extLst>
+          </p:cNvPr>
+          <p:cNvSpPr/>
+          <p:nvPr/>
+        </p:nvSpPr>
+        <p:spPr>
+          <a:xfrm>
+            <a:off x="9063438" y="1767508"/>
+            <a:ext cx="2411896" cy="874643"/>
+          </a:xfrm>
+          <a:prstGeom prst="rect">
+            <a:avLst/>
+          </a:prstGeom>
+        </p:spPr>
+        <p:style>
+          <a:lnRef idx="2">
+            <a:schemeClr val="accent1">
+              <a:shade val="50000"/>
+            </a:schemeClr>
+          </a:lnRef>
+          <a:fillRef idx="1">
+            <a:schemeClr val="accent1"/>
+          </a:fillRef>
+          <a:effectRef idx="0">
+            <a:schemeClr val="accent1"/>
+          </a:effectRef>
+          <a:fontRef idx="minor">
+            <a:schemeClr val="lt1"/>
+          </a:fontRef>
+        </p:style>
+        <p:txBody>
+          <a:bodyPr rtlCol="0" anchor="ctr"/>
+          <a:lstStyle/>
+          <a:p>
+            <a:pPr algn="ctr"/>
+            <a:r>
+              <a:rPr lang="es-MX" dirty="0"/>
+              <a:t>Regresar al programa.</a:t>
+            </a:r>
+          </a:p>
+        </p:txBody>
+      </p:sp>
+      <p:sp>
+        <p:nvSpPr>
+          <p:cNvPr id="24" name="Rectángulo 23">
+            <a:extLst>
+              <a:ext uri="{FF2B5EF4-FFF2-40B4-BE49-F238E27FC236}">
+                <a16:creationId xmlns:a16="http://schemas.microsoft.com/office/drawing/2014/main" id="{6DB2980E-8646-40C0-B041-C97A2E92E207}"/>
+              </a:ext>
+            </a:extLst>
+          </p:cNvPr>
+          <p:cNvSpPr/>
+          <p:nvPr/>
+        </p:nvSpPr>
+        <p:spPr>
+          <a:xfrm>
+            <a:off x="6054574" y="3096994"/>
+            <a:ext cx="2411896" cy="874643"/>
+          </a:xfrm>
+          <a:prstGeom prst="rect">
+            <a:avLst/>
+          </a:prstGeom>
+        </p:spPr>
+        <p:style>
+          <a:lnRef idx="2">
+            <a:schemeClr val="accent1">
+              <a:shade val="50000"/>
+            </a:schemeClr>
+          </a:lnRef>
+          <a:fillRef idx="1">
+            <a:schemeClr val="accent1"/>
+          </a:fillRef>
+          <a:effectRef idx="0">
+            <a:schemeClr val="accent1"/>
+          </a:effectRef>
+          <a:fontRef idx="minor">
+            <a:schemeClr val="lt1"/>
+          </a:fontRef>
+        </p:style>
+        <p:txBody>
+          <a:bodyPr rtlCol="0" anchor="ctr"/>
+          <a:lstStyle/>
+          <a:p>
+            <a:pPr algn="ctr"/>
+            <a:r>
+              <a:rPr lang="es-MX" dirty="0"/>
+              <a:t>Ejecutar el método </a:t>
+            </a:r>
+            <a:r>
+              <a:rPr lang="es-MX" dirty="0" err="1"/>
+              <a:t>get_scan</a:t>
+            </a:r>
+            <a:r>
+              <a:rPr lang="es-MX" dirty="0"/>
+              <a:t>.</a:t>
+            </a:r>
+          </a:p>
+        </p:txBody>
+      </p:sp>
+      <p:sp>
+        <p:nvSpPr>
+          <p:cNvPr id="25" name="Rectángulo 24">
+            <a:extLst>
+              <a:ext uri="{FF2B5EF4-FFF2-40B4-BE49-F238E27FC236}">
+                <a16:creationId xmlns:a16="http://schemas.microsoft.com/office/drawing/2014/main" id="{94E48053-AD03-4928-949D-44113D9A04FF}"/>
+              </a:ext>
+            </a:extLst>
+          </p:cNvPr>
+          <p:cNvSpPr/>
+          <p:nvPr/>
+        </p:nvSpPr>
+        <p:spPr>
+          <a:xfrm>
+            <a:off x="6054574" y="4286681"/>
+            <a:ext cx="2411896" cy="874643"/>
+          </a:xfrm>
+          <a:prstGeom prst="rect">
+            <a:avLst/>
+          </a:prstGeom>
+        </p:spPr>
+        <p:style>
+          <a:lnRef idx="2">
+            <a:schemeClr val="accent1">
+              <a:shade val="50000"/>
+            </a:schemeClr>
+          </a:lnRef>
+          <a:fillRef idx="1">
+            <a:schemeClr val="accent1"/>
+          </a:fillRef>
+          <a:effectRef idx="0">
+            <a:schemeClr val="accent1"/>
+          </a:effectRef>
+          <a:fontRef idx="minor">
+            <a:schemeClr val="lt1"/>
+          </a:fontRef>
+        </p:style>
+        <p:txBody>
+          <a:bodyPr rtlCol="0" anchor="ctr"/>
+          <a:lstStyle/>
+          <a:p>
+            <a:pPr algn="ctr"/>
+            <a:r>
+              <a:rPr lang="es-MX" dirty="0"/>
+              <a:t>Obtener la distancia mínima de los datos regresados.</a:t>
+            </a:r>
+          </a:p>
+        </p:txBody>
+      </p:sp>
+      <p:sp>
+        <p:nvSpPr>
+          <p:cNvPr id="26" name="Rectángulo 25">
+            <a:extLst>
+              <a:ext uri="{FF2B5EF4-FFF2-40B4-BE49-F238E27FC236}">
+                <a16:creationId xmlns:a16="http://schemas.microsoft.com/office/drawing/2014/main" id="{C8EBBEBB-D8AC-4D89-90C5-912CC268934F}"/>
+              </a:ext>
+            </a:extLst>
+          </p:cNvPr>
+          <p:cNvSpPr/>
+          <p:nvPr/>
+        </p:nvSpPr>
+        <p:spPr>
+          <a:xfrm>
+            <a:off x="6054574" y="5476368"/>
+            <a:ext cx="2411896" cy="874643"/>
+          </a:xfrm>
+          <a:prstGeom prst="rect">
+            <a:avLst/>
+          </a:prstGeom>
+        </p:spPr>
+        <p:style>
+          <a:lnRef idx="2">
+            <a:schemeClr val="accent1">
+              <a:shade val="50000"/>
+            </a:schemeClr>
+          </a:lnRef>
+          <a:fillRef idx="1">
+            <a:schemeClr val="accent1"/>
+          </a:fillRef>
+          <a:effectRef idx="0">
+            <a:schemeClr val="accent1"/>
+          </a:effectRef>
+          <a:fontRef idx="minor">
+            <a:schemeClr val="lt1"/>
+          </a:fontRef>
+        </p:style>
+        <p:txBody>
+          <a:bodyPr rtlCol="0" anchor="ctr"/>
+          <a:lstStyle/>
+          <a:p>
+            <a:pPr algn="ctr"/>
+            <a:r>
+              <a:rPr lang="es-MX" dirty="0"/>
+              <a:t>Publicar la distancia mínima.</a:t>
+            </a:r>
+          </a:p>
+        </p:txBody>
+      </p:sp>
+      <p:cxnSp>
+        <p:nvCxnSpPr>
+          <p:cNvPr id="36" name="Conector: angular 35">
+            <a:extLst>
+              <a:ext uri="{FF2B5EF4-FFF2-40B4-BE49-F238E27FC236}">
+                <a16:creationId xmlns:a16="http://schemas.microsoft.com/office/drawing/2014/main" id="{846699A5-D5E0-46B4-815F-78B063EC2DB6}"/>
+              </a:ext>
+            </a:extLst>
+          </p:cNvPr>
+          <p:cNvCxnSpPr>
+            <a:stCxn id="26" idx="1"/>
+            <a:endCxn id="7" idx="1"/>
+          </p:cNvCxnSpPr>
+          <p:nvPr/>
+        </p:nvCxnSpPr>
+        <p:spPr>
+          <a:xfrm rot="10800000">
+            <a:off x="6054574" y="2204830"/>
+            <a:ext cx="12700" cy="3708860"/>
+          </a:xfrm>
+          <a:prstGeom prst="bentConnector3">
+            <a:avLst>
+              <a:gd name="adj1" fmla="val 1800000"/>
+            </a:avLst>
+          </a:prstGeom>
+          <a:ln>
+            <a:tailEnd type="triangle"/>
+          </a:ln>
+        </p:spPr>
+        <p:style>
+          <a:lnRef idx="1">
+            <a:schemeClr val="accent1"/>
+          </a:lnRef>
+          <a:fillRef idx="0">
+            <a:schemeClr val="accent1"/>
+          </a:fillRef>
+          <a:effectRef idx="0">
+            <a:schemeClr val="accent1"/>
+          </a:effectRef>
+          <a:fontRef idx="minor">
+            <a:schemeClr val="tx1"/>
+          </a:fontRef>
+        </p:style>
+      </p:cxnSp>
+    </p:spTree>
+    <p:extLst>
+      <p:ext uri="{BB962C8B-B14F-4D97-AF65-F5344CB8AC3E}">
+        <p14:creationId xmlns:p14="http://schemas.microsoft.com/office/powerpoint/2010/main" val="386125876"/>
+      </p:ext>
+    </p:extLst>
+  </p:cSld>
+  <p:clrMapOvr>
+    <a:masterClrMapping/>
+  </p:clrMapOvr>
+</p:sld>
+</file>
+
+<file path=ppt/slides/slide13.xml><?xml version="1.0" encoding="utf-8"?>
+<p:sld xmlns:a="http://schemas.openxmlformats.org/drawingml/2006/main" xmlns:r="http://schemas.openxmlformats.org/officeDocument/2006/relationships" xmlns:p="http://schemas.openxmlformats.org/presentationml/2006/main">
+  <p:cSld>
+    <p:spTree>
+      <p:nvGrpSpPr>
+        <p:cNvPr id="1" name=""/>
+        <p:cNvGrpSpPr/>
+        <p:nvPr/>
+      </p:nvGrpSpPr>
+      <p:grpSpPr>
+        <a:xfrm>
+          <a:off x="0" y="0"/>
+          <a:ext cx="0" cy="0"/>
+          <a:chOff x="0" y="0"/>
+          <a:chExt cx="0" cy="0"/>
+        </a:xfrm>
+      </p:grpSpPr>
+      <p:sp>
+        <p:nvSpPr>
+          <p:cNvPr id="13" name="Rectángulo 12">
+            <a:extLst>
+              <a:ext uri="{FF2B5EF4-FFF2-40B4-BE49-F238E27FC236}">
+                <a16:creationId xmlns:a16="http://schemas.microsoft.com/office/drawing/2014/main" id="{E6289C9B-52FC-47EF-A7C7-2BBA0D26ECE1}"/>
+              </a:ext>
+            </a:extLst>
+          </p:cNvPr>
+          <p:cNvSpPr/>
+          <p:nvPr/>
+        </p:nvSpPr>
+        <p:spPr>
+          <a:xfrm>
+            <a:off x="427865" y="1472894"/>
+            <a:ext cx="2411896" cy="874643"/>
+          </a:xfrm>
+          <a:prstGeom prst="rect">
+            <a:avLst/>
+          </a:prstGeom>
+        </p:spPr>
+        <p:style>
+          <a:lnRef idx="2">
+            <a:schemeClr val="accent1">
+              <a:shade val="50000"/>
+            </a:schemeClr>
+          </a:lnRef>
+          <a:fillRef idx="1">
+            <a:schemeClr val="accent1"/>
+          </a:fillRef>
+          <a:effectRef idx="0">
+            <a:schemeClr val="accent1"/>
+          </a:effectRef>
+          <a:fontRef idx="minor">
+            <a:schemeClr val="lt1"/>
+          </a:fontRef>
+        </p:style>
+        <p:txBody>
+          <a:bodyPr rtlCol="0" anchor="ctr"/>
+          <a:lstStyle/>
+          <a:p>
+            <a:pPr algn="ctr"/>
+            <a:r>
+              <a:rPr lang="es-MX" dirty="0"/>
+              <a:t>Esperar y guardar el mensaje con las distancias del </a:t>
+            </a:r>
+            <a:r>
+              <a:rPr lang="es-MX" dirty="0" err="1"/>
+              <a:t>lidar</a:t>
+            </a:r>
+            <a:r>
+              <a:rPr lang="es-MX" dirty="0"/>
+              <a:t>.</a:t>
+            </a:r>
+          </a:p>
+        </p:txBody>
+      </p:sp>
+      <p:sp>
+        <p:nvSpPr>
+          <p:cNvPr id="16" name="Rectángulo 15">
+            <a:extLst>
+              <a:ext uri="{FF2B5EF4-FFF2-40B4-BE49-F238E27FC236}">
+                <a16:creationId xmlns:a16="http://schemas.microsoft.com/office/drawing/2014/main" id="{6C04F0C5-5D84-4BFF-8686-6D7AE63041F4}"/>
+              </a:ext>
+            </a:extLst>
+          </p:cNvPr>
+          <p:cNvSpPr/>
+          <p:nvPr/>
+        </p:nvSpPr>
+        <p:spPr>
+          <a:xfrm>
+            <a:off x="427865" y="325706"/>
+            <a:ext cx="2411896" cy="874643"/>
+          </a:xfrm>
+          <a:prstGeom prst="rect">
+            <a:avLst/>
+          </a:prstGeom>
+        </p:spPr>
+        <p:style>
+          <a:lnRef idx="2">
+            <a:schemeClr val="accent1">
+              <a:shade val="50000"/>
+            </a:schemeClr>
+          </a:lnRef>
+          <a:fillRef idx="1">
+            <a:schemeClr val="accent1"/>
+          </a:fillRef>
+          <a:effectRef idx="0">
+            <a:schemeClr val="accent1"/>
+          </a:effectRef>
+          <a:fontRef idx="minor">
+            <a:schemeClr val="lt1"/>
+          </a:fontRef>
+        </p:style>
+        <p:txBody>
+          <a:bodyPr rtlCol="0" anchor="ctr"/>
+          <a:lstStyle/>
+          <a:p>
+            <a:pPr algn="ctr"/>
+            <a:r>
+              <a:rPr lang="es-MX" dirty="0" err="1"/>
+              <a:t>get_scan</a:t>
+            </a:r>
+            <a:endParaRPr lang="es-MX" dirty="0"/>
+          </a:p>
+        </p:txBody>
+      </p:sp>
+      <p:sp>
+        <p:nvSpPr>
+          <p:cNvPr id="17" name="Rectángulo 16">
+            <a:extLst>
+              <a:ext uri="{FF2B5EF4-FFF2-40B4-BE49-F238E27FC236}">
+                <a16:creationId xmlns:a16="http://schemas.microsoft.com/office/drawing/2014/main" id="{4C1CB294-6FC6-407E-88ED-9FF6709781A8}"/>
+              </a:ext>
+            </a:extLst>
+          </p:cNvPr>
+          <p:cNvSpPr/>
+          <p:nvPr/>
+        </p:nvSpPr>
+        <p:spPr>
+          <a:xfrm>
+            <a:off x="427865" y="2648635"/>
+            <a:ext cx="2411896" cy="874643"/>
+          </a:xfrm>
+          <a:prstGeom prst="rect">
+            <a:avLst/>
+          </a:prstGeom>
+        </p:spPr>
+        <p:style>
+          <a:lnRef idx="2">
+            <a:schemeClr val="accent1">
+              <a:shade val="50000"/>
+            </a:schemeClr>
+          </a:lnRef>
+          <a:fillRef idx="1">
+            <a:schemeClr val="accent1"/>
+          </a:fillRef>
+          <a:effectRef idx="0">
+            <a:schemeClr val="accent1"/>
+          </a:effectRef>
+          <a:fontRef idx="minor">
+            <a:schemeClr val="lt1"/>
+          </a:fontRef>
+        </p:style>
+        <p:txBody>
+          <a:bodyPr rtlCol="0" anchor="ctr"/>
+          <a:lstStyle/>
+          <a:p>
+            <a:pPr algn="ctr"/>
+            <a:r>
+              <a:rPr lang="es-MX" dirty="0"/>
+              <a:t>Crear una lista vacía para guardar los datos.</a:t>
+            </a:r>
+          </a:p>
+        </p:txBody>
+      </p:sp>
+      <p:sp>
+        <p:nvSpPr>
+          <p:cNvPr id="18" name="Rectángulo 17">
+            <a:extLst>
+              <a:ext uri="{FF2B5EF4-FFF2-40B4-BE49-F238E27FC236}">
+                <a16:creationId xmlns:a16="http://schemas.microsoft.com/office/drawing/2014/main" id="{1D7A7C05-F8F7-41A7-96E8-E66CB6DE9D9E}"/>
+              </a:ext>
+            </a:extLst>
+          </p:cNvPr>
+          <p:cNvSpPr/>
+          <p:nvPr/>
+        </p:nvSpPr>
+        <p:spPr>
+          <a:xfrm>
+            <a:off x="427865" y="5877293"/>
+            <a:ext cx="2411896" cy="874643"/>
+          </a:xfrm>
+          <a:prstGeom prst="rect">
+            <a:avLst/>
+          </a:prstGeom>
+        </p:spPr>
+        <p:style>
+          <a:lnRef idx="2">
+            <a:schemeClr val="accent1">
+              <a:shade val="50000"/>
+            </a:schemeClr>
+          </a:lnRef>
+          <a:fillRef idx="1">
+            <a:schemeClr val="accent1"/>
+          </a:fillRef>
+          <a:effectRef idx="0">
+            <a:schemeClr val="accent1"/>
+          </a:effectRef>
+          <a:fontRef idx="minor">
+            <a:schemeClr val="lt1"/>
+          </a:fontRef>
+        </p:style>
+        <p:txBody>
+          <a:bodyPr rtlCol="0" anchor="ctr"/>
+          <a:lstStyle/>
+          <a:p>
+            <a:pPr algn="ctr"/>
+            <a:r>
+              <a:rPr lang="es-MX" dirty="0"/>
+              <a:t>Regresar al programa.</a:t>
+            </a:r>
+          </a:p>
+        </p:txBody>
+      </p:sp>
+      <p:sp>
+        <p:nvSpPr>
+          <p:cNvPr id="27" name="Rectángulo 26">
+            <a:extLst>
+              <a:ext uri="{FF2B5EF4-FFF2-40B4-BE49-F238E27FC236}">
+                <a16:creationId xmlns:a16="http://schemas.microsoft.com/office/drawing/2014/main" id="{CF54CCC6-5322-4405-9993-E2ED285A2DA0}"/>
+              </a:ext>
+            </a:extLst>
+          </p:cNvPr>
+          <p:cNvSpPr/>
+          <p:nvPr/>
+        </p:nvSpPr>
+        <p:spPr>
+          <a:xfrm>
+            <a:off x="427865" y="3824376"/>
+            <a:ext cx="2411896" cy="1751819"/>
+          </a:xfrm>
+          <a:prstGeom prst="rect">
+            <a:avLst/>
+          </a:prstGeom>
+        </p:spPr>
+        <p:style>
+          <a:lnRef idx="2">
+            <a:schemeClr val="accent1">
+              <a:shade val="50000"/>
+            </a:schemeClr>
+          </a:lnRef>
+          <a:fillRef idx="1">
+            <a:schemeClr val="accent1"/>
+          </a:fillRef>
+          <a:effectRef idx="0">
+            <a:schemeClr val="accent1"/>
+          </a:effectRef>
+          <a:fontRef idx="minor">
+            <a:schemeClr val="lt1"/>
+          </a:fontRef>
+        </p:style>
+        <p:txBody>
+          <a:bodyPr rtlCol="0" anchor="ctr"/>
+          <a:lstStyle/>
+          <a:p>
+            <a:pPr algn="ctr"/>
+            <a:r>
+              <a:rPr lang="es-MX" dirty="0"/>
+              <a:t>Guardar en la lista los valores mayores a la distancia de error y menores al límite de objeto cercano, entre 0° a 135° y 225° a 360°.</a:t>
+            </a:r>
+          </a:p>
+        </p:txBody>
+      </p:sp>
+    </p:spTree>
+    <p:extLst>
+      <p:ext uri="{BB962C8B-B14F-4D97-AF65-F5344CB8AC3E}">
+        <p14:creationId xmlns:p14="http://schemas.microsoft.com/office/powerpoint/2010/main" val="4032619229"/>
+      </p:ext>
+    </p:extLst>
+  </p:cSld>
+  <p:clrMapOvr>
+    <a:masterClrMapping/>
+  </p:clrMapOvr>
+</p:sld>
+</file>
+
+<file path=ppt/slides/slide14.xml><?xml version="1.0" encoding="utf-8"?>
+<p:sld xmlns:a="http://schemas.openxmlformats.org/drawingml/2006/main" xmlns:r="http://schemas.openxmlformats.org/officeDocument/2006/relationships" xmlns:p="http://schemas.openxmlformats.org/presentationml/2006/main">
+  <p:cSld>
+    <p:spTree>
+      <p:nvGrpSpPr>
+        <p:cNvPr id="1" name=""/>
+        <p:cNvGrpSpPr/>
+        <p:nvPr/>
+      </p:nvGrpSpPr>
+      <p:grpSpPr>
+        <a:xfrm>
+          <a:off x="0" y="0"/>
+          <a:ext cx="0" cy="0"/>
+          <a:chOff x="0" y="0"/>
+          <a:chExt cx="0" cy="0"/>
+        </a:xfrm>
+      </p:grpSpPr>
+      <p:sp>
+        <p:nvSpPr>
+          <p:cNvPr id="4" name="Rectángulo 3">
+            <a:extLst>
+              <a:ext uri="{FF2B5EF4-FFF2-40B4-BE49-F238E27FC236}">
+                <a16:creationId xmlns:a16="http://schemas.microsoft.com/office/drawing/2014/main" id="{89FDC41C-B80C-4A5A-85FE-2C1798ED01B1}"/>
+              </a:ext>
+            </a:extLst>
+          </p:cNvPr>
+          <p:cNvSpPr/>
+          <p:nvPr/>
+        </p:nvSpPr>
+        <p:spPr>
+          <a:xfrm>
+            <a:off x="424073" y="325779"/>
+            <a:ext cx="2928727" cy="2099921"/>
+          </a:xfrm>
+          <a:prstGeom prst="rect">
+            <a:avLst/>
+          </a:prstGeom>
+        </p:spPr>
+        <p:style>
+          <a:lnRef idx="2">
+            <a:schemeClr val="accent1">
+              <a:shade val="50000"/>
+            </a:schemeClr>
+          </a:lnRef>
+          <a:fillRef idx="1">
+            <a:schemeClr val="accent1"/>
+          </a:fillRef>
+          <a:effectRef idx="0">
+            <a:schemeClr val="accent1"/>
+          </a:effectRef>
+          <a:fontRef idx="minor">
+            <a:schemeClr val="lt1"/>
+          </a:fontRef>
+        </p:style>
+        <p:txBody>
+          <a:bodyPr rtlCol="0" anchor="ctr"/>
+          <a:lstStyle/>
+          <a:p>
+            <a:pPr algn="ctr"/>
+            <a:r>
+              <a:rPr lang="es-MX" dirty="0" err="1"/>
+              <a:t>LaserVFH</a:t>
+            </a:r>
+            <a:endParaRPr lang="es-MX" dirty="0"/>
+          </a:p>
+          <a:p>
+            <a:pPr algn="ctr"/>
+            <a:r>
+              <a:rPr lang="es-MX" dirty="0"/>
+              <a:t>_________________</a:t>
+            </a:r>
+          </a:p>
+          <a:p>
+            <a:pPr algn="ctr"/>
+            <a:r>
+              <a:rPr lang="es-MX" dirty="0"/>
+              <a:t>__</a:t>
+            </a:r>
+            <a:r>
+              <a:rPr lang="es-MX" dirty="0" err="1"/>
+              <a:t>init</a:t>
+            </a:r>
+            <a:r>
+              <a:rPr lang="es-MX" dirty="0"/>
+              <a:t>__(</a:t>
+            </a:r>
+            <a:r>
+              <a:rPr lang="es-MX" dirty="0" err="1"/>
+              <a:t>self</a:t>
+            </a:r>
+            <a:r>
+              <a:rPr lang="es-MX" dirty="0"/>
+              <a:t>)</a:t>
+            </a:r>
+          </a:p>
+          <a:p>
+            <a:pPr algn="ctr"/>
+            <a:r>
+              <a:rPr lang="es-MX" dirty="0" err="1"/>
+              <a:t>poseCallback</a:t>
+            </a:r>
+            <a:r>
+              <a:rPr lang="es-MX" dirty="0"/>
+              <a:t>(</a:t>
+            </a:r>
+            <a:r>
+              <a:rPr lang="es-MX" dirty="0" err="1"/>
+              <a:t>self</a:t>
+            </a:r>
+            <a:r>
+              <a:rPr lang="es-MX" dirty="0"/>
+              <a:t>)</a:t>
+            </a:r>
+          </a:p>
+          <a:p>
+            <a:pPr algn="ctr"/>
+            <a:r>
+              <a:rPr lang="es-MX" dirty="0" err="1"/>
+              <a:t>LaserCallback</a:t>
+            </a:r>
+            <a:r>
+              <a:rPr lang="es-MX" dirty="0"/>
+              <a:t>(</a:t>
+            </a:r>
+            <a:r>
+              <a:rPr lang="es-MX" dirty="0" err="1"/>
+              <a:t>self</a:t>
+            </a:r>
+            <a:r>
+              <a:rPr lang="es-MX" dirty="0"/>
+              <a:t>)</a:t>
+            </a:r>
+          </a:p>
+        </p:txBody>
+      </p:sp>
+      <p:sp>
+        <p:nvSpPr>
+          <p:cNvPr id="6" name="Rectángulo 5">
+            <a:extLst>
+              <a:ext uri="{FF2B5EF4-FFF2-40B4-BE49-F238E27FC236}">
+                <a16:creationId xmlns:a16="http://schemas.microsoft.com/office/drawing/2014/main" id="{FB4145F7-410D-4130-BD24-AA1ACA7C588D}"/>
+              </a:ext>
+            </a:extLst>
+          </p:cNvPr>
+          <p:cNvSpPr/>
+          <p:nvPr/>
+        </p:nvSpPr>
+        <p:spPr>
+          <a:xfrm>
+            <a:off x="3684104" y="997697"/>
+            <a:ext cx="2411896" cy="756084"/>
+          </a:xfrm>
+          <a:prstGeom prst="rect">
+            <a:avLst/>
+          </a:prstGeom>
+        </p:spPr>
+        <p:style>
+          <a:lnRef idx="2">
+            <a:schemeClr val="accent1">
+              <a:shade val="50000"/>
+            </a:schemeClr>
+          </a:lnRef>
+          <a:fillRef idx="1">
+            <a:schemeClr val="accent1"/>
+          </a:fillRef>
+          <a:effectRef idx="0">
+            <a:schemeClr val="accent1"/>
+          </a:effectRef>
+          <a:fontRef idx="minor">
+            <a:schemeClr val="lt1"/>
+          </a:fontRef>
+        </p:style>
+        <p:txBody>
+          <a:bodyPr rtlCol="0" anchor="ctr"/>
+          <a:lstStyle/>
+          <a:p>
+            <a:pPr algn="ctr"/>
+            <a:r>
+              <a:rPr lang="es-MX" dirty="0"/>
+              <a:t>Publisher</a:t>
+            </a:r>
+          </a:p>
+        </p:txBody>
+      </p:sp>
+    </p:spTree>
+    <p:extLst>
+      <p:ext uri="{BB962C8B-B14F-4D97-AF65-F5344CB8AC3E}">
+        <p14:creationId xmlns:p14="http://schemas.microsoft.com/office/powerpoint/2010/main" val="3582750681"/>
+      </p:ext>
+    </p:extLst>
+  </p:cSld>
+  <p:clrMapOvr>
+    <a:masterClrMapping/>
+  </p:clrMapOvr>
+</p:sld>
+</file>
+
+<file path=ppt/slides/slide15.xml><?xml version="1.0" encoding="utf-8"?>
+<p:sld xmlns:a="http://schemas.openxmlformats.org/drawingml/2006/main" xmlns:r="http://schemas.openxmlformats.org/officeDocument/2006/relationships" xmlns:p="http://schemas.openxmlformats.org/presentationml/2006/main">
+  <p:cSld>
+    <p:spTree>
+      <p:nvGrpSpPr>
+        <p:cNvPr id="1" name=""/>
+        <p:cNvGrpSpPr/>
+        <p:nvPr/>
+      </p:nvGrpSpPr>
+      <p:grpSpPr>
+        <a:xfrm>
+          <a:off x="0" y="0"/>
+          <a:ext cx="0" cy="0"/>
+          <a:chOff x="0" y="0"/>
+          <a:chExt cx="0" cy="0"/>
+        </a:xfrm>
+      </p:grpSpPr>
+      <p:sp>
+        <p:nvSpPr>
+          <p:cNvPr id="4" name="Elipse 3">
+            <a:extLst>
+              <a:ext uri="{FF2B5EF4-FFF2-40B4-BE49-F238E27FC236}">
+                <a16:creationId xmlns:a16="http://schemas.microsoft.com/office/drawing/2014/main" id="{8A0CDFFF-D7BD-41C6-824E-5E7F39A20166}"/>
+              </a:ext>
+            </a:extLst>
+          </p:cNvPr>
+          <p:cNvSpPr/>
+          <p:nvPr/>
+        </p:nvSpPr>
+        <p:spPr>
+          <a:xfrm>
+            <a:off x="424621" y="217005"/>
+            <a:ext cx="2411896" cy="1113182"/>
+          </a:xfrm>
+          <a:prstGeom prst="ellipse">
+            <a:avLst/>
+          </a:prstGeom>
+        </p:spPr>
+        <p:style>
+          <a:lnRef idx="2">
+            <a:schemeClr val="accent1">
+              <a:shade val="50000"/>
+            </a:schemeClr>
+          </a:lnRef>
+          <a:fillRef idx="1">
+            <a:schemeClr val="accent1"/>
+          </a:fillRef>
+          <a:effectRef idx="0">
+            <a:schemeClr val="accent1"/>
+          </a:effectRef>
+          <a:fontRef idx="minor">
+            <a:schemeClr val="lt1"/>
+          </a:fontRef>
+        </p:style>
+        <p:txBody>
+          <a:bodyPr rtlCol="0" anchor="ctr"/>
+          <a:lstStyle/>
+          <a:p>
+            <a:pPr algn="ctr"/>
+            <a:r>
+              <a:rPr lang="es-MX" dirty="0"/>
+              <a:t>Inicio</a:t>
+            </a:r>
+          </a:p>
+        </p:txBody>
+      </p:sp>
+      <p:sp>
+        <p:nvSpPr>
+          <p:cNvPr id="5" name="Rectángulo 4">
+            <a:extLst>
+              <a:ext uri="{FF2B5EF4-FFF2-40B4-BE49-F238E27FC236}">
+                <a16:creationId xmlns:a16="http://schemas.microsoft.com/office/drawing/2014/main" id="{EF547F28-9F48-47FC-AC79-583D2DC3D94C}"/>
+              </a:ext>
+            </a:extLst>
+          </p:cNvPr>
+          <p:cNvSpPr/>
+          <p:nvPr/>
+        </p:nvSpPr>
+        <p:spPr>
+          <a:xfrm>
+            <a:off x="424621" y="1573694"/>
+            <a:ext cx="2411896" cy="874643"/>
+          </a:xfrm>
+          <a:prstGeom prst="rect">
+            <a:avLst/>
+          </a:prstGeom>
+        </p:spPr>
+        <p:style>
+          <a:lnRef idx="2">
+            <a:schemeClr val="accent1">
+              <a:shade val="50000"/>
+            </a:schemeClr>
+          </a:lnRef>
+          <a:fillRef idx="1">
+            <a:schemeClr val="accent1"/>
+          </a:fillRef>
+          <a:effectRef idx="0">
+            <a:schemeClr val="accent1"/>
+          </a:effectRef>
+          <a:fontRef idx="minor">
+            <a:schemeClr val="lt1"/>
+          </a:fontRef>
+        </p:style>
+        <p:txBody>
+          <a:bodyPr rtlCol="0" anchor="ctr"/>
+          <a:lstStyle/>
+          <a:p>
+            <a:pPr algn="ctr"/>
+            <a:r>
+              <a:rPr lang="es-MX" dirty="0"/>
+              <a:t>Inicializar el nodo “</a:t>
+            </a:r>
+            <a:r>
+              <a:rPr lang="es-MX" dirty="0" err="1"/>
+              <a:t>Laser_VFH</a:t>
+            </a:r>
+            <a:r>
+              <a:rPr lang="es-MX" dirty="0"/>
+              <a:t>”.</a:t>
+            </a:r>
+          </a:p>
+        </p:txBody>
+      </p:sp>
+      <p:sp>
+        <p:nvSpPr>
+          <p:cNvPr id="16" name="Rectángulo 15">
+            <a:extLst>
+              <a:ext uri="{FF2B5EF4-FFF2-40B4-BE49-F238E27FC236}">
+                <a16:creationId xmlns:a16="http://schemas.microsoft.com/office/drawing/2014/main" id="{6C04F0C5-5D84-4BFF-8686-6D7AE63041F4}"/>
+              </a:ext>
+            </a:extLst>
+          </p:cNvPr>
+          <p:cNvSpPr/>
+          <p:nvPr/>
+        </p:nvSpPr>
+        <p:spPr>
+          <a:xfrm>
+            <a:off x="3423353" y="215911"/>
+            <a:ext cx="2411896" cy="874643"/>
+          </a:xfrm>
+          <a:prstGeom prst="rect">
+            <a:avLst/>
+          </a:prstGeom>
+        </p:spPr>
+        <p:style>
+          <a:lnRef idx="2">
+            <a:schemeClr val="accent1">
+              <a:shade val="50000"/>
+            </a:schemeClr>
+          </a:lnRef>
+          <a:fillRef idx="1">
+            <a:schemeClr val="accent1"/>
+          </a:fillRef>
+          <a:effectRef idx="0">
+            <a:schemeClr val="accent1"/>
+          </a:effectRef>
+          <a:fontRef idx="minor">
+            <a:schemeClr val="lt1"/>
+          </a:fontRef>
+        </p:style>
+        <p:txBody>
+          <a:bodyPr rtlCol="0" anchor="ctr"/>
+          <a:lstStyle/>
+          <a:p>
+            <a:pPr algn="ctr"/>
+            <a:r>
+              <a:rPr lang="es-MX" dirty="0" err="1"/>
+              <a:t>poseCallback</a:t>
+            </a:r>
+            <a:endParaRPr lang="es-MX" dirty="0"/>
+          </a:p>
+        </p:txBody>
+      </p:sp>
+      <p:sp>
+        <p:nvSpPr>
+          <p:cNvPr id="27" name="Rectángulo 26">
+            <a:extLst>
+              <a:ext uri="{FF2B5EF4-FFF2-40B4-BE49-F238E27FC236}">
+                <a16:creationId xmlns:a16="http://schemas.microsoft.com/office/drawing/2014/main" id="{019D8496-E0B4-44EF-8D5B-1AEA7B76246D}"/>
+              </a:ext>
+            </a:extLst>
+          </p:cNvPr>
+          <p:cNvSpPr/>
+          <p:nvPr/>
+        </p:nvSpPr>
+        <p:spPr>
+          <a:xfrm>
+            <a:off x="424621" y="2911701"/>
+            <a:ext cx="2411896" cy="874643"/>
+          </a:xfrm>
+          <a:prstGeom prst="rect">
+            <a:avLst/>
+          </a:prstGeom>
+        </p:spPr>
+        <p:style>
+          <a:lnRef idx="2">
+            <a:schemeClr val="accent1">
+              <a:shade val="50000"/>
+            </a:schemeClr>
+          </a:lnRef>
+          <a:fillRef idx="1">
+            <a:schemeClr val="accent1"/>
+          </a:fillRef>
+          <a:effectRef idx="0">
+            <a:schemeClr val="accent1"/>
+          </a:effectRef>
+          <a:fontRef idx="minor">
+            <a:schemeClr val="lt1"/>
+          </a:fontRef>
+        </p:style>
+        <p:txBody>
+          <a:bodyPr rtlCol="0" anchor="ctr"/>
+          <a:lstStyle/>
+          <a:p>
+            <a:pPr algn="ctr"/>
+            <a:r>
+              <a:rPr lang="es-MX" dirty="0"/>
+              <a:t>Construir el objeto “</a:t>
+            </a:r>
+            <a:r>
+              <a:rPr lang="es-MX" dirty="0" err="1"/>
+              <a:t>LaserVFH</a:t>
+            </a:r>
+            <a:r>
+              <a:rPr lang="es-MX" dirty="0"/>
+              <a:t>”.</a:t>
+            </a:r>
+          </a:p>
+        </p:txBody>
+      </p:sp>
+      <p:sp>
+        <p:nvSpPr>
+          <p:cNvPr id="29" name="Rectángulo 28">
+            <a:extLst>
+              <a:ext uri="{FF2B5EF4-FFF2-40B4-BE49-F238E27FC236}">
+                <a16:creationId xmlns:a16="http://schemas.microsoft.com/office/drawing/2014/main" id="{B93FF06B-80D8-425D-80DC-D042D2EF376E}"/>
+              </a:ext>
+            </a:extLst>
+          </p:cNvPr>
+          <p:cNvSpPr/>
+          <p:nvPr/>
+        </p:nvSpPr>
+        <p:spPr>
+          <a:xfrm>
+            <a:off x="424621" y="4177283"/>
+            <a:ext cx="2411896" cy="874643"/>
+          </a:xfrm>
+          <a:prstGeom prst="rect">
+            <a:avLst/>
+          </a:prstGeom>
+        </p:spPr>
+        <p:style>
+          <a:lnRef idx="2">
+            <a:schemeClr val="accent1">
+              <a:shade val="50000"/>
+            </a:schemeClr>
+          </a:lnRef>
+          <a:fillRef idx="1">
+            <a:schemeClr val="accent1"/>
+          </a:fillRef>
+          <a:effectRef idx="0">
+            <a:schemeClr val="accent1"/>
+          </a:effectRef>
+          <a:fontRef idx="minor">
+            <a:schemeClr val="lt1"/>
+          </a:fontRef>
+        </p:style>
+        <p:txBody>
+          <a:bodyPr rtlCol="0" anchor="ctr"/>
+          <a:lstStyle/>
+          <a:p>
+            <a:pPr algn="ctr"/>
+            <a:r>
+              <a:rPr lang="es-MX" dirty="0"/>
+              <a:t>¿Esta ROS ejecutándose?</a:t>
+            </a:r>
+          </a:p>
+        </p:txBody>
+      </p:sp>
+      <p:sp>
+        <p:nvSpPr>
+          <p:cNvPr id="30" name="Diagrama de flujo: terminador 29">
+            <a:extLst>
+              <a:ext uri="{FF2B5EF4-FFF2-40B4-BE49-F238E27FC236}">
+                <a16:creationId xmlns:a16="http://schemas.microsoft.com/office/drawing/2014/main" id="{EDA0CA19-EA7D-4352-9B43-BF8B488BBC9D}"/>
+              </a:ext>
+            </a:extLst>
+          </p:cNvPr>
+          <p:cNvSpPr/>
+          <p:nvPr/>
+        </p:nvSpPr>
+        <p:spPr>
+          <a:xfrm>
+            <a:off x="424621" y="5330222"/>
+            <a:ext cx="2411896" cy="1113182"/>
+          </a:xfrm>
+          <a:prstGeom prst="flowChartTerminator">
+            <a:avLst/>
+          </a:prstGeom>
+        </p:spPr>
+        <p:style>
+          <a:lnRef idx="2">
+            <a:schemeClr val="accent1">
+              <a:shade val="50000"/>
+            </a:schemeClr>
+          </a:lnRef>
+          <a:fillRef idx="1">
+            <a:schemeClr val="accent1"/>
+          </a:fillRef>
+          <a:effectRef idx="0">
+            <a:schemeClr val="accent1"/>
+          </a:effectRef>
+          <a:fontRef idx="minor">
+            <a:schemeClr val="lt1"/>
+          </a:fontRef>
+        </p:style>
+        <p:txBody>
+          <a:bodyPr rtlCol="0" anchor="ctr"/>
+          <a:lstStyle/>
+          <a:p>
+            <a:pPr algn="ctr"/>
+            <a:r>
+              <a:rPr lang="es-MX" dirty="0"/>
+              <a:t>FIN</a:t>
+            </a:r>
+          </a:p>
+        </p:txBody>
+      </p:sp>
+      <p:sp>
+        <p:nvSpPr>
+          <p:cNvPr id="31" name="CuadroTexto 30">
+            <a:extLst>
+              <a:ext uri="{FF2B5EF4-FFF2-40B4-BE49-F238E27FC236}">
+                <a16:creationId xmlns:a16="http://schemas.microsoft.com/office/drawing/2014/main" id="{520BCFB5-9E3C-4CBF-962A-62B13C37565B}"/>
+              </a:ext>
+            </a:extLst>
+          </p:cNvPr>
+          <p:cNvSpPr txBox="1"/>
+          <p:nvPr/>
+        </p:nvSpPr>
+        <p:spPr>
+          <a:xfrm>
+            <a:off x="1401944" y="5006408"/>
+            <a:ext cx="664842" cy="369332"/>
+          </a:xfrm>
+          <a:prstGeom prst="rect">
+            <a:avLst/>
+          </a:prstGeom>
+          <a:noFill/>
+        </p:spPr>
+        <p:txBody>
+          <a:bodyPr wrap="square" rtlCol="0">
+            <a:spAutoFit/>
+          </a:bodyPr>
+          <a:lstStyle/>
+          <a:p>
+            <a:r>
+              <a:rPr lang="es-MX" dirty="0"/>
+              <a:t>No</a:t>
+            </a:r>
+          </a:p>
+        </p:txBody>
+      </p:sp>
+      <p:sp>
+        <p:nvSpPr>
+          <p:cNvPr id="32" name="CuadroTexto 31">
+            <a:extLst>
+              <a:ext uri="{FF2B5EF4-FFF2-40B4-BE49-F238E27FC236}">
+                <a16:creationId xmlns:a16="http://schemas.microsoft.com/office/drawing/2014/main" id="{F4CB3F75-E875-4143-85A2-DA47B03EF710}"/>
+              </a:ext>
+            </a:extLst>
+          </p:cNvPr>
+          <p:cNvSpPr txBox="1"/>
+          <p:nvPr/>
+        </p:nvSpPr>
+        <p:spPr>
+          <a:xfrm>
+            <a:off x="2762596" y="4414238"/>
+            <a:ext cx="343364" cy="369332"/>
+          </a:xfrm>
+          <a:prstGeom prst="rect">
+            <a:avLst/>
+          </a:prstGeom>
+          <a:noFill/>
+        </p:spPr>
+        <p:txBody>
+          <a:bodyPr wrap="none" rtlCol="0">
+            <a:spAutoFit/>
+          </a:bodyPr>
+          <a:lstStyle/>
+          <a:p>
+            <a:r>
+              <a:rPr lang="es-MX" dirty="0"/>
+              <a:t>Si</a:t>
+            </a:r>
+          </a:p>
+        </p:txBody>
+      </p:sp>
+      <p:cxnSp>
+        <p:nvCxnSpPr>
+          <p:cNvPr id="33" name="Conector: angular 32">
+            <a:extLst>
+              <a:ext uri="{FF2B5EF4-FFF2-40B4-BE49-F238E27FC236}">
+                <a16:creationId xmlns:a16="http://schemas.microsoft.com/office/drawing/2014/main" id="{6D59A7FB-B741-4CA6-8147-6709F3F5B697}"/>
+              </a:ext>
+            </a:extLst>
+          </p:cNvPr>
+          <p:cNvCxnSpPr>
+            <a:cxnSpLocks/>
+            <a:stCxn id="32" idx="3"/>
+          </p:cNvCxnSpPr>
+          <p:nvPr/>
+        </p:nvCxnSpPr>
+        <p:spPr>
+          <a:xfrm flipH="1" flipV="1">
+            <a:off x="1609052" y="3968562"/>
+            <a:ext cx="1496908" cy="630342"/>
+          </a:xfrm>
+          <a:prstGeom prst="bentConnector3">
+            <a:avLst>
+              <a:gd name="adj1" fmla="val -9959"/>
+            </a:avLst>
+          </a:prstGeom>
+          <a:ln>
+            <a:tailEnd type="triangle"/>
+          </a:ln>
+        </p:spPr>
+        <p:style>
+          <a:lnRef idx="1">
+            <a:schemeClr val="accent1"/>
+          </a:lnRef>
+          <a:fillRef idx="0">
+            <a:schemeClr val="accent1"/>
+          </a:fillRef>
+          <a:effectRef idx="0">
+            <a:schemeClr val="accent1"/>
+          </a:effectRef>
+          <a:fontRef idx="minor">
+            <a:schemeClr val="tx1"/>
+          </a:fontRef>
+        </p:style>
+      </p:cxnSp>
+      <p:cxnSp>
+        <p:nvCxnSpPr>
+          <p:cNvPr id="34" name="Conector recto 33">
+            <a:extLst>
+              <a:ext uri="{FF2B5EF4-FFF2-40B4-BE49-F238E27FC236}">
+                <a16:creationId xmlns:a16="http://schemas.microsoft.com/office/drawing/2014/main" id="{7162A84E-C777-45DA-A7FA-E43DA96194B9}"/>
+              </a:ext>
+            </a:extLst>
+          </p:cNvPr>
+          <p:cNvCxnSpPr>
+            <a:stCxn id="27" idx="2"/>
+          </p:cNvCxnSpPr>
+          <p:nvPr/>
+        </p:nvCxnSpPr>
+        <p:spPr>
+          <a:xfrm>
+            <a:off x="1630569" y="3786344"/>
+            <a:ext cx="0" cy="394251"/>
+          </a:xfrm>
+          <a:prstGeom prst="line">
+            <a:avLst/>
+          </a:prstGeom>
+        </p:spPr>
+        <p:style>
+          <a:lnRef idx="1">
+            <a:schemeClr val="accent1"/>
+          </a:lnRef>
+          <a:fillRef idx="0">
+            <a:schemeClr val="accent1"/>
+          </a:fillRef>
+          <a:effectRef idx="0">
+            <a:schemeClr val="accent1"/>
+          </a:effectRef>
+          <a:fontRef idx="minor">
+            <a:schemeClr val="tx1"/>
+          </a:fontRef>
+        </p:style>
+      </p:cxnSp>
+      <p:sp>
+        <p:nvSpPr>
+          <p:cNvPr id="35" name="Rectángulo 34">
+            <a:extLst>
+              <a:ext uri="{FF2B5EF4-FFF2-40B4-BE49-F238E27FC236}">
+                <a16:creationId xmlns:a16="http://schemas.microsoft.com/office/drawing/2014/main" id="{C573500E-EB1A-41B4-B822-7B75EA30C735}"/>
+              </a:ext>
+            </a:extLst>
+          </p:cNvPr>
+          <p:cNvSpPr/>
+          <p:nvPr/>
+        </p:nvSpPr>
+        <p:spPr>
+          <a:xfrm>
+            <a:off x="3403390" y="1507760"/>
+            <a:ext cx="2411896" cy="1139687"/>
+          </a:xfrm>
+          <a:prstGeom prst="rect">
+            <a:avLst/>
+          </a:prstGeom>
+        </p:spPr>
+        <p:style>
+          <a:lnRef idx="2">
+            <a:schemeClr val="accent1">
+              <a:shade val="50000"/>
+            </a:schemeClr>
+          </a:lnRef>
+          <a:fillRef idx="1">
+            <a:schemeClr val="accent1"/>
+          </a:fillRef>
+          <a:effectRef idx="0">
+            <a:schemeClr val="accent1"/>
+          </a:effectRef>
+          <a:fontRef idx="minor">
+            <a:schemeClr val="lt1"/>
+          </a:fontRef>
+        </p:style>
+        <p:txBody>
+          <a:bodyPr rtlCol="0" anchor="ctr"/>
+          <a:lstStyle/>
+          <a:p>
+            <a:pPr algn="ctr"/>
+            <a:r>
+              <a:rPr lang="es-MX" dirty="0"/>
+              <a:t>Obtener y guardar la posición del líder.</a:t>
+            </a:r>
+          </a:p>
+        </p:txBody>
+      </p:sp>
+      <p:sp>
+        <p:nvSpPr>
+          <p:cNvPr id="36" name="Rectángulo 35">
+            <a:extLst>
+              <a:ext uri="{FF2B5EF4-FFF2-40B4-BE49-F238E27FC236}">
+                <a16:creationId xmlns:a16="http://schemas.microsoft.com/office/drawing/2014/main" id="{F16479CC-0F80-4A13-B0FD-7C3F20D573C4}"/>
+              </a:ext>
+            </a:extLst>
+          </p:cNvPr>
+          <p:cNvSpPr/>
+          <p:nvPr/>
+        </p:nvSpPr>
+        <p:spPr>
+          <a:xfrm>
+            <a:off x="3403390" y="2767266"/>
+            <a:ext cx="2411896" cy="694311"/>
+          </a:xfrm>
+          <a:prstGeom prst="rect">
+            <a:avLst/>
+          </a:prstGeom>
+        </p:spPr>
+        <p:style>
+          <a:lnRef idx="2">
+            <a:schemeClr val="accent1">
+              <a:shade val="50000"/>
+            </a:schemeClr>
+          </a:lnRef>
+          <a:fillRef idx="1">
+            <a:schemeClr val="accent1"/>
+          </a:fillRef>
+          <a:effectRef idx="0">
+            <a:schemeClr val="accent1"/>
+          </a:effectRef>
+          <a:fontRef idx="minor">
+            <a:schemeClr val="lt1"/>
+          </a:fontRef>
+        </p:style>
+        <p:txBody>
+          <a:bodyPr rtlCol="0" anchor="ctr"/>
+          <a:lstStyle/>
+          <a:p>
+            <a:pPr algn="ctr"/>
+            <a:r>
+              <a:rPr lang="es-MX" dirty="0"/>
+              <a:t>Prender la bandera de posición recibida.</a:t>
+            </a:r>
+          </a:p>
+        </p:txBody>
+      </p:sp>
+      <p:sp>
+        <p:nvSpPr>
+          <p:cNvPr id="37" name="Rectángulo 36">
+            <a:extLst>
+              <a:ext uri="{FF2B5EF4-FFF2-40B4-BE49-F238E27FC236}">
+                <a16:creationId xmlns:a16="http://schemas.microsoft.com/office/drawing/2014/main" id="{3B5C354B-30A0-4ED8-B3E6-17848E555FAF}"/>
+              </a:ext>
+            </a:extLst>
+          </p:cNvPr>
+          <p:cNvSpPr/>
+          <p:nvPr/>
+        </p:nvSpPr>
+        <p:spPr>
+          <a:xfrm>
+            <a:off x="3403390" y="3663381"/>
+            <a:ext cx="2411896" cy="874643"/>
+          </a:xfrm>
+          <a:prstGeom prst="rect">
+            <a:avLst/>
+          </a:prstGeom>
+        </p:spPr>
+        <p:style>
+          <a:lnRef idx="2">
+            <a:schemeClr val="accent1">
+              <a:shade val="50000"/>
+            </a:schemeClr>
+          </a:lnRef>
+          <a:fillRef idx="1">
+            <a:schemeClr val="accent1"/>
+          </a:fillRef>
+          <a:effectRef idx="0">
+            <a:schemeClr val="accent1"/>
+          </a:effectRef>
+          <a:fontRef idx="minor">
+            <a:schemeClr val="lt1"/>
+          </a:fontRef>
+        </p:style>
+        <p:txBody>
+          <a:bodyPr rtlCol="0" anchor="ctr"/>
+          <a:lstStyle/>
+          <a:p>
+            <a:pPr algn="ctr"/>
+            <a:r>
+              <a:rPr lang="es-MX" dirty="0"/>
+              <a:t>Regresar al programa.</a:t>
+            </a:r>
+          </a:p>
+        </p:txBody>
+      </p:sp>
+    </p:spTree>
+    <p:extLst>
+      <p:ext uri="{BB962C8B-B14F-4D97-AF65-F5344CB8AC3E}">
+        <p14:creationId xmlns:p14="http://schemas.microsoft.com/office/powerpoint/2010/main" val="3055251495"/>
+      </p:ext>
+    </p:extLst>
+  </p:cSld>
+  <p:clrMapOvr>
+    <a:masterClrMapping/>
+  </p:clrMapOvr>
+</p:sld>
+</file>
+
+<file path=ppt/slides/slide16.xml><?xml version="1.0" encoding="utf-8"?>
+<p:sld xmlns:a="http://schemas.openxmlformats.org/drawingml/2006/main" xmlns:r="http://schemas.openxmlformats.org/officeDocument/2006/relationships" xmlns:p="http://schemas.openxmlformats.org/presentationml/2006/main">
+  <p:cSld>
+    <p:spTree>
+      <p:nvGrpSpPr>
+        <p:cNvPr id="1" name=""/>
+        <p:cNvGrpSpPr/>
+        <p:nvPr/>
+      </p:nvGrpSpPr>
+      <p:grpSpPr>
+        <a:xfrm>
+          <a:off x="0" y="0"/>
+          <a:ext cx="0" cy="0"/>
+          <a:chOff x="0" y="0"/>
+          <a:chExt cx="0" cy="0"/>
+        </a:xfrm>
+      </p:grpSpPr>
+      <p:sp>
+        <p:nvSpPr>
+          <p:cNvPr id="7" name="Rectángulo 6">
+            <a:extLst>
+              <a:ext uri="{FF2B5EF4-FFF2-40B4-BE49-F238E27FC236}">
+                <a16:creationId xmlns:a16="http://schemas.microsoft.com/office/drawing/2014/main" id="{0EF1B095-F210-4A79-B578-F84D6DECE908}"/>
+              </a:ext>
+            </a:extLst>
+          </p:cNvPr>
+          <p:cNvSpPr/>
+          <p:nvPr/>
+        </p:nvSpPr>
+        <p:spPr>
+          <a:xfrm>
+            <a:off x="250618" y="1598401"/>
+            <a:ext cx="2411896" cy="874643"/>
+          </a:xfrm>
+          <a:prstGeom prst="rect">
+            <a:avLst/>
+          </a:prstGeom>
+        </p:spPr>
+        <p:style>
+          <a:lnRef idx="2">
+            <a:schemeClr val="accent1">
+              <a:shade val="50000"/>
+            </a:schemeClr>
+          </a:lnRef>
+          <a:fillRef idx="1">
+            <a:schemeClr val="accent1"/>
+          </a:fillRef>
+          <a:effectRef idx="0">
+            <a:schemeClr val="accent1"/>
+          </a:effectRef>
+          <a:fontRef idx="minor">
+            <a:schemeClr val="lt1"/>
+          </a:fontRef>
+        </p:style>
+        <p:txBody>
+          <a:bodyPr rtlCol="0" anchor="ctr"/>
+          <a:lstStyle/>
+          <a:p>
+            <a:pPr algn="ctr"/>
+            <a:r>
+              <a:rPr lang="es-MX" dirty="0"/>
+              <a:t>¿Está prendida la bandera de posición?</a:t>
+            </a:r>
+          </a:p>
+        </p:txBody>
+      </p:sp>
+      <p:sp>
+        <p:nvSpPr>
+          <p:cNvPr id="9" name="CuadroTexto 8">
+            <a:extLst>
+              <a:ext uri="{FF2B5EF4-FFF2-40B4-BE49-F238E27FC236}">
+                <a16:creationId xmlns:a16="http://schemas.microsoft.com/office/drawing/2014/main" id="{B1940B23-DDCA-4811-8E5B-FB8CB3DC489E}"/>
+              </a:ext>
+            </a:extLst>
+          </p:cNvPr>
+          <p:cNvSpPr txBox="1"/>
+          <p:nvPr/>
+        </p:nvSpPr>
+        <p:spPr>
+          <a:xfrm>
+            <a:off x="1311250" y="2515799"/>
+            <a:ext cx="664842" cy="369332"/>
+          </a:xfrm>
+          <a:prstGeom prst="rect">
+            <a:avLst/>
+          </a:prstGeom>
+          <a:noFill/>
+        </p:spPr>
+        <p:txBody>
+          <a:bodyPr wrap="square" rtlCol="0">
+            <a:spAutoFit/>
+          </a:bodyPr>
+          <a:lstStyle/>
+          <a:p>
+            <a:r>
+              <a:rPr lang="es-MX" dirty="0"/>
+              <a:t>Si</a:t>
+            </a:r>
+          </a:p>
+        </p:txBody>
+      </p:sp>
+      <p:sp>
+        <p:nvSpPr>
+          <p:cNvPr id="10" name="CuadroTexto 9">
+            <a:extLst>
+              <a:ext uri="{FF2B5EF4-FFF2-40B4-BE49-F238E27FC236}">
+                <a16:creationId xmlns:a16="http://schemas.microsoft.com/office/drawing/2014/main" id="{AD7F4633-C228-43D4-8C3D-29E9D5B24E21}"/>
+              </a:ext>
+            </a:extLst>
+          </p:cNvPr>
+          <p:cNvSpPr txBox="1"/>
+          <p:nvPr/>
+        </p:nvSpPr>
+        <p:spPr>
+          <a:xfrm>
+            <a:off x="2733211" y="1851056"/>
+            <a:ext cx="455574" cy="369332"/>
+          </a:xfrm>
+          <a:prstGeom prst="rect">
+            <a:avLst/>
+          </a:prstGeom>
+          <a:noFill/>
+        </p:spPr>
+        <p:txBody>
+          <a:bodyPr wrap="none" rtlCol="0">
+            <a:spAutoFit/>
+          </a:bodyPr>
+          <a:lstStyle/>
+          <a:p>
+            <a:r>
+              <a:rPr lang="es-MX" dirty="0"/>
+              <a:t>No</a:t>
+            </a:r>
+          </a:p>
+        </p:txBody>
+      </p:sp>
+      <p:cxnSp>
+        <p:nvCxnSpPr>
+          <p:cNvPr id="12" name="Conector recto 11">
+            <a:extLst>
+              <a:ext uri="{FF2B5EF4-FFF2-40B4-BE49-F238E27FC236}">
+                <a16:creationId xmlns:a16="http://schemas.microsoft.com/office/drawing/2014/main" id="{1716C8E9-BF98-4F39-B5BF-5B047132C4F6}"/>
+              </a:ext>
+            </a:extLst>
+          </p:cNvPr>
+          <p:cNvCxnSpPr>
+            <a:cxnSpLocks/>
+            <a:stCxn id="21" idx="2"/>
+          </p:cNvCxnSpPr>
+          <p:nvPr/>
+        </p:nvCxnSpPr>
+        <p:spPr>
+          <a:xfrm>
+            <a:off x="1456566" y="1041810"/>
+            <a:ext cx="0" cy="559903"/>
+          </a:xfrm>
+          <a:prstGeom prst="line">
+            <a:avLst/>
+          </a:prstGeom>
+        </p:spPr>
+        <p:style>
+          <a:lnRef idx="1">
+            <a:schemeClr val="accent1"/>
+          </a:lnRef>
+          <a:fillRef idx="0">
+            <a:schemeClr val="accent1"/>
+          </a:fillRef>
+          <a:effectRef idx="0">
+            <a:schemeClr val="accent1"/>
+          </a:effectRef>
+          <a:fontRef idx="minor">
+            <a:schemeClr val="tx1"/>
+          </a:fontRef>
+        </p:style>
+      </p:cxnSp>
+      <p:sp>
+        <p:nvSpPr>
+          <p:cNvPr id="21" name="Rectángulo 20">
+            <a:extLst>
+              <a:ext uri="{FF2B5EF4-FFF2-40B4-BE49-F238E27FC236}">
+                <a16:creationId xmlns:a16="http://schemas.microsoft.com/office/drawing/2014/main" id="{4FAECDE4-C5B9-4F11-8F17-7313F769A5D3}"/>
+              </a:ext>
+            </a:extLst>
+          </p:cNvPr>
+          <p:cNvSpPr/>
+          <p:nvPr/>
+        </p:nvSpPr>
+        <p:spPr>
+          <a:xfrm>
+            <a:off x="250618" y="167167"/>
+            <a:ext cx="2411896" cy="874643"/>
+          </a:xfrm>
+          <a:prstGeom prst="rect">
+            <a:avLst/>
+          </a:prstGeom>
+        </p:spPr>
+        <p:style>
+          <a:lnRef idx="2">
+            <a:schemeClr val="accent1">
+              <a:shade val="50000"/>
+            </a:schemeClr>
+          </a:lnRef>
+          <a:fillRef idx="1">
+            <a:schemeClr val="accent1"/>
+          </a:fillRef>
+          <a:effectRef idx="0">
+            <a:schemeClr val="accent1"/>
+          </a:effectRef>
+          <a:fontRef idx="minor">
+            <a:schemeClr val="lt1"/>
+          </a:fontRef>
+        </p:style>
+        <p:txBody>
+          <a:bodyPr rtlCol="0" anchor="ctr"/>
+          <a:lstStyle/>
+          <a:p>
+            <a:pPr algn="ctr"/>
+            <a:r>
+              <a:rPr lang="es-MX" dirty="0" err="1"/>
+              <a:t>LaserCallback</a:t>
+            </a:r>
+            <a:endParaRPr lang="es-MX" dirty="0"/>
+          </a:p>
+        </p:txBody>
+      </p:sp>
+      <p:cxnSp>
+        <p:nvCxnSpPr>
+          <p:cNvPr id="22" name="Conector recto de flecha 21">
+            <a:extLst>
+              <a:ext uri="{FF2B5EF4-FFF2-40B4-BE49-F238E27FC236}">
+                <a16:creationId xmlns:a16="http://schemas.microsoft.com/office/drawing/2014/main" id="{508AF149-28C8-487F-A3C9-EF8C628E6F3C}"/>
+              </a:ext>
+            </a:extLst>
+          </p:cNvPr>
+          <p:cNvCxnSpPr>
+            <a:cxnSpLocks/>
+            <a:endCxn id="23" idx="1"/>
+          </p:cNvCxnSpPr>
+          <p:nvPr/>
+        </p:nvCxnSpPr>
+        <p:spPr>
+          <a:xfrm>
+            <a:off x="3030641" y="2035723"/>
+            <a:ext cx="228841" cy="0"/>
+          </a:xfrm>
+          <a:prstGeom prst="straightConnector1">
+            <a:avLst/>
+          </a:prstGeom>
+          <a:ln>
+            <a:tailEnd type="triangle"/>
+          </a:ln>
+        </p:spPr>
+        <p:style>
+          <a:lnRef idx="1">
+            <a:schemeClr val="accent1"/>
+          </a:lnRef>
+          <a:fillRef idx="0">
+            <a:schemeClr val="accent1"/>
+          </a:fillRef>
+          <a:effectRef idx="0">
+            <a:schemeClr val="accent1"/>
+          </a:effectRef>
+          <a:fontRef idx="minor">
+            <a:schemeClr val="tx1"/>
+          </a:fontRef>
+        </p:style>
+      </p:cxnSp>
+      <p:sp>
+        <p:nvSpPr>
+          <p:cNvPr id="23" name="Rectángulo 22">
+            <a:extLst>
+              <a:ext uri="{FF2B5EF4-FFF2-40B4-BE49-F238E27FC236}">
+                <a16:creationId xmlns:a16="http://schemas.microsoft.com/office/drawing/2014/main" id="{52401543-C856-42E9-9E87-7FCBFFDFB2C2}"/>
+              </a:ext>
+            </a:extLst>
+          </p:cNvPr>
+          <p:cNvSpPr/>
+          <p:nvPr/>
+        </p:nvSpPr>
+        <p:spPr>
+          <a:xfrm>
+            <a:off x="3259482" y="1598401"/>
+            <a:ext cx="2411896" cy="874643"/>
+          </a:xfrm>
+          <a:prstGeom prst="rect">
+            <a:avLst/>
+          </a:prstGeom>
+        </p:spPr>
+        <p:style>
+          <a:lnRef idx="2">
+            <a:schemeClr val="accent1">
+              <a:shade val="50000"/>
+            </a:schemeClr>
+          </a:lnRef>
+          <a:fillRef idx="1">
+            <a:schemeClr val="accent1"/>
+          </a:fillRef>
+          <a:effectRef idx="0">
+            <a:schemeClr val="accent1"/>
+          </a:effectRef>
+          <a:fontRef idx="minor">
+            <a:schemeClr val="lt1"/>
+          </a:fontRef>
+        </p:style>
+        <p:txBody>
+          <a:bodyPr rtlCol="0" anchor="ctr"/>
+          <a:lstStyle/>
+          <a:p>
+            <a:pPr algn="ctr"/>
+            <a:r>
+              <a:rPr lang="es-MX" dirty="0"/>
+              <a:t>Regresar al programa.</a:t>
+            </a:r>
+          </a:p>
+        </p:txBody>
+      </p:sp>
+      <p:sp>
+        <p:nvSpPr>
+          <p:cNvPr id="24" name="Rectángulo 23">
+            <a:extLst>
+              <a:ext uri="{FF2B5EF4-FFF2-40B4-BE49-F238E27FC236}">
+                <a16:creationId xmlns:a16="http://schemas.microsoft.com/office/drawing/2014/main" id="{6DB2980E-8646-40C0-B041-C97A2E92E207}"/>
+              </a:ext>
+            </a:extLst>
+          </p:cNvPr>
+          <p:cNvSpPr/>
+          <p:nvPr/>
+        </p:nvSpPr>
+        <p:spPr>
+          <a:xfrm>
+            <a:off x="250618" y="2834156"/>
+            <a:ext cx="2411896" cy="1189687"/>
+          </a:xfrm>
+          <a:prstGeom prst="rect">
+            <a:avLst/>
+          </a:prstGeom>
+        </p:spPr>
+        <p:style>
+          <a:lnRef idx="2">
+            <a:schemeClr val="accent1">
+              <a:shade val="50000"/>
+            </a:schemeClr>
+          </a:lnRef>
+          <a:fillRef idx="1">
+            <a:schemeClr val="accent1"/>
+          </a:fillRef>
+          <a:effectRef idx="0">
+            <a:schemeClr val="accent1"/>
+          </a:effectRef>
+          <a:fontRef idx="minor">
+            <a:schemeClr val="lt1"/>
+          </a:fontRef>
+        </p:style>
+        <p:txBody>
+          <a:bodyPr rtlCol="0" anchor="ctr"/>
+          <a:lstStyle/>
+          <a:p>
+            <a:pPr algn="ctr"/>
+            <a:r>
+              <a:rPr lang="es-MX" dirty="0"/>
+              <a:t>Obtener las distancias del </a:t>
+            </a:r>
+            <a:r>
+              <a:rPr lang="es-MX" dirty="0" err="1"/>
+              <a:t>lidar</a:t>
+            </a:r>
+            <a:r>
+              <a:rPr lang="es-MX" dirty="0"/>
+              <a:t> y ajustar los datos a la orientación del líder. </a:t>
+            </a:r>
+          </a:p>
+        </p:txBody>
+      </p:sp>
+      <p:sp>
+        <p:nvSpPr>
+          <p:cNvPr id="25" name="Rectángulo 24">
+            <a:extLst>
+              <a:ext uri="{FF2B5EF4-FFF2-40B4-BE49-F238E27FC236}">
+                <a16:creationId xmlns:a16="http://schemas.microsoft.com/office/drawing/2014/main" id="{94E48053-AD03-4928-949D-44113D9A04FF}"/>
+              </a:ext>
+            </a:extLst>
+          </p:cNvPr>
+          <p:cNvSpPr/>
+          <p:nvPr/>
+        </p:nvSpPr>
+        <p:spPr>
+          <a:xfrm>
+            <a:off x="240627" y="4168549"/>
+            <a:ext cx="2492583" cy="874643"/>
+          </a:xfrm>
+          <a:prstGeom prst="rect">
+            <a:avLst/>
+          </a:prstGeom>
+        </p:spPr>
+        <p:style>
+          <a:lnRef idx="2">
+            <a:schemeClr val="accent1">
+              <a:shade val="50000"/>
+            </a:schemeClr>
+          </a:lnRef>
+          <a:fillRef idx="1">
+            <a:schemeClr val="accent1"/>
+          </a:fillRef>
+          <a:effectRef idx="0">
+            <a:schemeClr val="accent1"/>
+          </a:effectRef>
+          <a:fontRef idx="minor">
+            <a:schemeClr val="lt1"/>
+          </a:fontRef>
+        </p:style>
+        <p:txBody>
+          <a:bodyPr rtlCol="0" anchor="ctr"/>
+          <a:lstStyle/>
+          <a:p>
+            <a:pPr algn="ctr"/>
+            <a:r>
+              <a:rPr lang="es-MX" dirty="0"/>
+              <a:t>Crear histograma binario según si es ángulo sin obstáculo o no.</a:t>
+            </a:r>
+          </a:p>
+        </p:txBody>
+      </p:sp>
+      <p:sp>
+        <p:nvSpPr>
+          <p:cNvPr id="26" name="Rectángulo 25">
+            <a:extLst>
+              <a:ext uri="{FF2B5EF4-FFF2-40B4-BE49-F238E27FC236}">
+                <a16:creationId xmlns:a16="http://schemas.microsoft.com/office/drawing/2014/main" id="{C8EBBEBB-D8AC-4D89-90C5-912CC268934F}"/>
+              </a:ext>
+            </a:extLst>
+          </p:cNvPr>
+          <p:cNvSpPr/>
+          <p:nvPr/>
+        </p:nvSpPr>
+        <p:spPr>
+          <a:xfrm>
+            <a:off x="250618" y="5307261"/>
+            <a:ext cx="2411896" cy="1113182"/>
+          </a:xfrm>
+          <a:prstGeom prst="rect">
+            <a:avLst/>
+          </a:prstGeom>
+        </p:spPr>
+        <p:style>
+          <a:lnRef idx="2">
+            <a:schemeClr val="accent1">
+              <a:shade val="50000"/>
+            </a:schemeClr>
+          </a:lnRef>
+          <a:fillRef idx="1">
+            <a:schemeClr val="accent1"/>
+          </a:fillRef>
+          <a:effectRef idx="0">
+            <a:schemeClr val="accent1"/>
+          </a:effectRef>
+          <a:fontRef idx="minor">
+            <a:schemeClr val="lt1"/>
+          </a:fontRef>
+        </p:style>
+        <p:txBody>
+          <a:bodyPr rtlCol="0" anchor="ctr"/>
+          <a:lstStyle/>
+          <a:p>
+            <a:pPr algn="ctr"/>
+            <a:r>
+              <a:rPr lang="es-MX" dirty="0"/>
+              <a:t>Obtener la derivada del histograma y a partir de esta crea las listas de valles y crestas.</a:t>
+            </a:r>
+          </a:p>
+        </p:txBody>
+      </p:sp>
+      <p:sp>
+        <p:nvSpPr>
+          <p:cNvPr id="28" name="Rectángulo 27">
+            <a:extLst>
+              <a:ext uri="{FF2B5EF4-FFF2-40B4-BE49-F238E27FC236}">
+                <a16:creationId xmlns:a16="http://schemas.microsoft.com/office/drawing/2014/main" id="{B9A8BAE6-210E-43F2-833B-2C766D96C597}"/>
+              </a:ext>
+            </a:extLst>
+          </p:cNvPr>
+          <p:cNvSpPr/>
+          <p:nvPr/>
+        </p:nvSpPr>
+        <p:spPr>
+          <a:xfrm>
+            <a:off x="6096000" y="122298"/>
+            <a:ext cx="2411896" cy="1406000"/>
+          </a:xfrm>
+          <a:prstGeom prst="rect">
+            <a:avLst/>
+          </a:prstGeom>
+        </p:spPr>
+        <p:style>
+          <a:lnRef idx="2">
+            <a:schemeClr val="accent1">
+              <a:shade val="50000"/>
+            </a:schemeClr>
+          </a:lnRef>
+          <a:fillRef idx="1">
+            <a:schemeClr val="accent1"/>
+          </a:fillRef>
+          <a:effectRef idx="0">
+            <a:schemeClr val="accent1"/>
+          </a:effectRef>
+          <a:fontRef idx="minor">
+            <a:schemeClr val="lt1"/>
+          </a:fontRef>
+        </p:style>
+        <p:txBody>
+          <a:bodyPr rtlCol="0" anchor="ctr"/>
+          <a:lstStyle/>
+          <a:p>
+            <a:pPr algn="ctr"/>
+            <a:r>
+              <a:rPr lang="es-MX" dirty="0"/>
+              <a:t>Para cada ángulo de cresta o valle ensanchar el histograma dando una menor cantidad de ángulos libres.</a:t>
+            </a:r>
+          </a:p>
+        </p:txBody>
+      </p:sp>
+      <p:sp>
+        <p:nvSpPr>
+          <p:cNvPr id="38" name="Rectángulo 37">
+            <a:extLst>
+              <a:ext uri="{FF2B5EF4-FFF2-40B4-BE49-F238E27FC236}">
+                <a16:creationId xmlns:a16="http://schemas.microsoft.com/office/drawing/2014/main" id="{180F7778-DE57-4989-9AAE-DCA72B52F245}"/>
+              </a:ext>
+            </a:extLst>
+          </p:cNvPr>
+          <p:cNvSpPr/>
+          <p:nvPr/>
+        </p:nvSpPr>
+        <p:spPr>
+          <a:xfrm>
+            <a:off x="6096000" y="1770044"/>
+            <a:ext cx="2411896" cy="1406000"/>
+          </a:xfrm>
+          <a:prstGeom prst="rect">
+            <a:avLst/>
+          </a:prstGeom>
+        </p:spPr>
+        <p:style>
+          <a:lnRef idx="2">
+            <a:schemeClr val="accent1">
+              <a:shade val="50000"/>
+            </a:schemeClr>
+          </a:lnRef>
+          <a:fillRef idx="1">
+            <a:schemeClr val="accent1"/>
+          </a:fillRef>
+          <a:effectRef idx="0">
+            <a:schemeClr val="accent1"/>
+          </a:effectRef>
+          <a:fontRef idx="minor">
+            <a:schemeClr val="lt1"/>
+          </a:fontRef>
+        </p:style>
+        <p:txBody>
+          <a:bodyPr rtlCol="0" anchor="ctr"/>
+          <a:lstStyle/>
+          <a:p>
+            <a:pPr algn="ctr"/>
+            <a:r>
+              <a:rPr lang="es-MX" dirty="0"/>
+              <a:t>Publicar el histograma polar ya ensanchado.</a:t>
+            </a:r>
+          </a:p>
+        </p:txBody>
+      </p:sp>
+      <p:cxnSp>
+        <p:nvCxnSpPr>
+          <p:cNvPr id="39" name="Conector recto de flecha 38">
+            <a:extLst>
+              <a:ext uri="{FF2B5EF4-FFF2-40B4-BE49-F238E27FC236}">
+                <a16:creationId xmlns:a16="http://schemas.microsoft.com/office/drawing/2014/main" id="{99192EE7-F5EA-4C46-83D2-FCDFABC7CF0F}"/>
+              </a:ext>
+            </a:extLst>
+          </p:cNvPr>
+          <p:cNvCxnSpPr>
+            <a:cxnSpLocks/>
+            <a:stCxn id="38" idx="1"/>
+            <a:endCxn id="23" idx="3"/>
+          </p:cNvCxnSpPr>
+          <p:nvPr/>
+        </p:nvCxnSpPr>
+        <p:spPr>
+          <a:xfrm flipH="1" flipV="1">
+            <a:off x="5671378" y="2035723"/>
+            <a:ext cx="424622" cy="437321"/>
+          </a:xfrm>
+          <a:prstGeom prst="straightConnector1">
+            <a:avLst/>
+          </a:prstGeom>
+          <a:ln>
+            <a:tailEnd type="triangle"/>
+          </a:ln>
+        </p:spPr>
+        <p:style>
+          <a:lnRef idx="1">
+            <a:schemeClr val="accent1"/>
+          </a:lnRef>
+          <a:fillRef idx="0">
+            <a:schemeClr val="accent1"/>
+          </a:fillRef>
+          <a:effectRef idx="0">
+            <a:schemeClr val="accent1"/>
+          </a:effectRef>
+          <a:fontRef idx="minor">
+            <a:schemeClr val="tx1"/>
+          </a:fontRef>
+        </p:style>
+      </p:cxnSp>
+    </p:spTree>
+    <p:extLst>
+      <p:ext uri="{BB962C8B-B14F-4D97-AF65-F5344CB8AC3E}">
+        <p14:creationId xmlns:p14="http://schemas.microsoft.com/office/powerpoint/2010/main" val="2380591694"/>
       </p:ext>
     </p:extLst>
   </p:cSld>
@@ -5076,7 +7958,7 @@
             <a:pPr algn="ctr"/>
             <a:r>
               <a:rPr lang="es-MX" dirty="0"/>
-              <a:t>Obtiene la distancia al punto más cercano de la celda a la trayectoria, junto con un índice identificador.</a:t>
+              <a:t>Obtener la distancia al punto más cercano de la celda a la trayectoria, junto con un índice identificador.</a:t>
             </a:r>
           </a:p>
         </p:txBody>
@@ -5179,37 +8061,37 @@
         </p:nvSpPr>
         <p:spPr>
           <a:xfrm>
-            <a:off x="556595" y="4369993"/>
-            <a:ext cx="2411896" cy="874643"/>
-          </a:xfrm>
-          <a:prstGeom prst="rect">
-            <a:avLst/>
-          </a:prstGeom>
-        </p:spPr>
-        <p:style>
-          <a:lnRef idx="2">
-            <a:schemeClr val="accent1">
-              <a:shade val="50000"/>
-            </a:schemeClr>
-          </a:lnRef>
-          <a:fillRef idx="1">
-            <a:schemeClr val="accent1"/>
-          </a:fillRef>
-          <a:effectRef idx="0">
-            <a:schemeClr val="accent1"/>
-          </a:effectRef>
-          <a:fontRef idx="minor">
-            <a:schemeClr val="lt1"/>
-          </a:fontRef>
-        </p:style>
-        <p:txBody>
-          <a:bodyPr rtlCol="0" anchor="ctr"/>
-          <a:lstStyle/>
-          <a:p>
-            <a:pPr algn="ctr"/>
-            <a:r>
-              <a:rPr lang="es-MX" dirty="0"/>
-              <a:t>Elegir como punto a llegar el punto mas cercano a la trayectoria.</a:t>
+            <a:off x="450577" y="4369993"/>
+            <a:ext cx="2623932" cy="984519"/>
+          </a:xfrm>
+          <a:prstGeom prst="rect">
+            <a:avLst/>
+          </a:prstGeom>
+        </p:spPr>
+        <p:style>
+          <a:lnRef idx="2">
+            <a:schemeClr val="accent1">
+              <a:shade val="50000"/>
+            </a:schemeClr>
+          </a:lnRef>
+          <a:fillRef idx="1">
+            <a:schemeClr val="accent1"/>
+          </a:fillRef>
+          <a:effectRef idx="0">
+            <a:schemeClr val="accent1"/>
+          </a:effectRef>
+          <a:fontRef idx="minor">
+            <a:schemeClr val="lt1"/>
+          </a:fontRef>
+        </p:style>
+        <p:txBody>
+          <a:bodyPr rtlCol="0" anchor="ctr"/>
+          <a:lstStyle/>
+          <a:p>
+            <a:pPr algn="ctr"/>
+            <a:r>
+              <a:rPr lang="es-MX" dirty="0"/>
+              <a:t>Elegir como punto a llegar el punto más cercano a la trayectoria.</a:t>
             </a:r>
           </a:p>
         </p:txBody>
@@ -5228,7 +8110,7 @@
         </p:nvSpPr>
         <p:spPr>
           <a:xfrm>
-            <a:off x="1534756" y="5252118"/>
+            <a:off x="1534756" y="5310656"/>
             <a:ext cx="455574" cy="369332"/>
           </a:xfrm>
           <a:prstGeom prst="rect">
@@ -5293,7 +8175,7 @@
             <a:pPr algn="ctr"/>
             <a:r>
               <a:rPr lang="es-MX" dirty="0"/>
-              <a:t>Elegir como punto a llegar el 3er punto mas cercano a la trayectoria.</a:t>
+              <a:t>Elegir como punto a llegar el 3er punto más cercano a la trayectoria.</a:t>
             </a:r>
           </a:p>
         </p:txBody>
@@ -5342,7 +8224,7 @@
             <a:pPr algn="ctr"/>
             <a:r>
               <a:rPr lang="es-MX" dirty="0"/>
-              <a:t>Obtiene el índice del elemento meta, usando el módulo para estar en rango.</a:t>
+              <a:t>Obtener el índice del elemento meta, usando el operador módulo para estar en rango.</a:t>
             </a:r>
           </a:p>
         </p:txBody>
@@ -5391,7 +8273,7 @@
             <a:pPr algn="ctr"/>
             <a:r>
               <a:rPr lang="es-MX" dirty="0"/>
-              <a:t>Obtiene las distancias entre el punto meta y él de la celda por medio de una diferencia.</a:t>
+              <a:t>Obtener las distancias entre el punto meta y el de la celda por medio de una diferencia.</a:t>
             </a:r>
           </a:p>
         </p:txBody>
@@ -5440,7 +8322,7 @@
             <a:pPr algn="ctr"/>
             <a:r>
               <a:rPr lang="es-MX" dirty="0"/>
-              <a:t>Retorna al programa.</a:t>
+              <a:t>Regresar al programa.</a:t>
             </a:r>
           </a:p>
         </p:txBody>
@@ -5489,7 +8371,7 @@
             <a:pPr algn="ctr"/>
             <a:r>
               <a:rPr lang="es-MX" dirty="0"/>
-              <a:t>Guarda dentro de la matriz las distancias calculadas para “x” e “y”.</a:t>
+              <a:t>Guardar dentro de la matriz de fuerza las distancias calculadas para “x” e “y”.</a:t>
             </a:r>
           </a:p>
         </p:txBody>
@@ -5979,14 +8861,7 @@
             <a:pPr algn="ctr"/>
             <a:r>
               <a:rPr lang="es-MX" dirty="0"/>
-              <a:t>Inicializar el nodo </a:t>
-            </a:r>
-          </a:p>
-          <a:p>
-            <a:pPr algn="ctr"/>
-            <a:r>
-              <a:rPr lang="es-MX" dirty="0"/>
-              <a:t>“</a:t>
+              <a:t>Inicializar el nodo “</a:t>
             </a:r>
             <a:r>
               <a:rPr lang="es-MX" dirty="0" err="1"/>
@@ -5994,7 +8869,7 @@
             </a:r>
             <a:r>
               <a:rPr lang="es-MX" dirty="0"/>
-              <a:t>”</a:t>
+              <a:t>”.</a:t>
             </a:r>
           </a:p>
         </p:txBody>
@@ -6099,12 +8974,8 @@
           <a:p>
             <a:pPr algn="ctr"/>
             <a:r>
-              <a:rPr lang="es-MX" dirty="0" err="1"/>
-              <a:t>Eejecutar</a:t>
-            </a:r>
-            <a:r>
-              <a:rPr lang="es-MX" dirty="0"/>
-              <a:t> método “</a:t>
+              <a:rPr lang="es-MX" dirty="0"/>
+              <a:t>Ejecutar el método “</a:t>
             </a:r>
             <a:r>
               <a:rPr lang="es-MX" dirty="0" err="1"/>
@@ -6112,14 +8983,14 @@
             </a:r>
             <a:r>
               <a:rPr lang="es-MX" dirty="0"/>
-              <a:t>”</a:t>
-            </a:r>
-          </a:p>
-        </p:txBody>
-      </p:sp>
-      <p:sp>
-        <p:nvSpPr>
-          <p:cNvPr id="8" name="Elipse 7">
+              <a:t>”.</a:t>
+            </a:r>
+          </a:p>
+        </p:txBody>
+      </p:sp>
+      <p:sp>
+        <p:nvSpPr>
+          <p:cNvPr id="8" name="Diagrama de flujo: terminador 7">
             <a:extLst>
               <a:ext uri="{FF2B5EF4-FFF2-40B4-BE49-F238E27FC236}">
                 <a16:creationId xmlns:a16="http://schemas.microsoft.com/office/drawing/2014/main" id="{E8DAFF3D-7FF5-4465-9392-F73F8BD34D14}"/>
@@ -6134,7 +9005,7 @@
             <a:off x="1414319" y="5497918"/>
             <a:ext cx="2411896" cy="1113182"/>
           </a:xfrm>
-          <a:prstGeom prst="ellipse">
+          <a:prstGeom prst="flowChartTerminator">
             <a:avLst/>
           </a:prstGeom>
         </p:spPr>
@@ -6260,7 +9131,7 @@
             <a:pPr algn="ctr"/>
             <a:r>
               <a:rPr lang="es-MX" dirty="0"/>
-              <a:t>Esperar que todos los publicadores hayan enviado el primer dato</a:t>
+              <a:t>Esperar que todos los publicadores hayan enviado el primer dato.</a:t>
             </a:r>
           </a:p>
         </p:txBody>
@@ -6393,7 +9264,7 @@
             <a:pPr algn="ctr"/>
             <a:r>
               <a:rPr lang="es-MX" dirty="0"/>
-              <a:t>Regresar al programa principal.</a:t>
+              <a:t>Regresar al programa.</a:t>
             </a:r>
           </a:p>
         </p:txBody>
@@ -6477,7 +9348,7 @@
             <a:pPr algn="ctr"/>
             <a:r>
               <a:rPr lang="es-MX" dirty="0"/>
-              <a:t>¿Ya trayectoria se seleccionó y se indicó avanzar?</a:t>
+              <a:t>¿Ya se seleccionó trayectoria y se indicó avanzar?</a:t>
             </a:r>
           </a:p>
         </p:txBody>
@@ -6560,12 +9431,8 @@
           <a:p>
             <a:pPr algn="ctr"/>
             <a:r>
-              <a:rPr lang="es-MX" dirty="0" err="1"/>
-              <a:t>Eejecutar</a:t>
-            </a:r>
-            <a:r>
-              <a:rPr lang="es-MX" dirty="0"/>
-              <a:t> método “</a:t>
+              <a:rPr lang="es-MX" dirty="0"/>
+              <a:t>Ejecutar el método “</a:t>
             </a:r>
             <a:r>
               <a:rPr lang="es-MX" dirty="0" err="1"/>
@@ -6573,7 +9440,7 @@
             </a:r>
             <a:r>
               <a:rPr lang="es-MX" dirty="0"/>
-              <a:t>”</a:t>
+              <a:t>”.</a:t>
             </a:r>
           </a:p>
         </p:txBody>
@@ -6657,7 +9524,7 @@
             <a:pPr algn="ctr"/>
             <a:r>
               <a:rPr lang="es-MX" dirty="0"/>
-              <a:t>Parar al líder .</a:t>
+              <a:t>Parar al líder.</a:t>
             </a:r>
           </a:p>
         </p:txBody>
@@ -6824,7 +9691,7 @@
             <a:pPr algn="ctr"/>
             <a:r>
               <a:rPr lang="es-MX" dirty="0" err="1"/>
-              <a:t>Follow</a:t>
+              <a:t>follow</a:t>
             </a:r>
             <a:endParaRPr lang="es-MX" dirty="0"/>
           </a:p>
@@ -6923,7 +9790,7 @@
             <a:pPr algn="ctr"/>
             <a:r>
               <a:rPr lang="es-MX" dirty="0"/>
-              <a:t>¿Ya se seleccionó trayectoria?</a:t>
+              <a:t>¿Ya se seleccionó la trayectoria?</a:t>
             </a:r>
           </a:p>
         </p:txBody>
@@ -7091,7 +9958,7 @@
             <a:pPr algn="ctr"/>
             <a:r>
               <a:rPr lang="es-MX" dirty="0"/>
-              <a:t>Parar al líder  y regresar al programa principal.</a:t>
+              <a:t>Parar al líder y regresar al programa principal.</a:t>
             </a:r>
           </a:p>
         </p:txBody>
@@ -7140,7 +10007,7 @@
             <a:pPr algn="ctr"/>
             <a:r>
               <a:rPr lang="es-MX" dirty="0"/>
-              <a:t>Obtener el ángulo meta a llegar.</a:t>
+              <a:t>Obtener el ángulo meta u orientación a llegar.</a:t>
             </a:r>
           </a:p>
         </p:txBody>
@@ -7189,7 +10056,7 @@
             <a:pPr algn="ctr"/>
             <a:r>
               <a:rPr lang="es-MX" dirty="0"/>
-              <a:t>¿Está lejos de algún obstáculo o es un ángulo libre?</a:t>
+              <a:t>¿Está lejos el ángulo de algún obstáculo o es un ángulo libre?</a:t>
             </a:r>
           </a:p>
         </p:txBody>
@@ -7273,7 +10140,7 @@
             <a:pPr algn="ctr"/>
             <a:r>
               <a:rPr lang="es-MX" dirty="0"/>
-              <a:t>Ejecutar método move2angle para alinear la orientación.</a:t>
+              <a:t>Ejecutar el método “move2angle” para alinear la orientación.</a:t>
             </a:r>
           </a:p>
         </p:txBody>
@@ -7327,43 +10194,46 @@
         </p:nvSpPr>
         <p:spPr>
           <a:xfrm>
-            <a:off x="3427372" y="4226893"/>
-            <a:ext cx="2411896" cy="874643"/>
-          </a:xfrm>
-          <a:prstGeom prst="rect">
-            <a:avLst/>
-          </a:prstGeom>
-        </p:spPr>
-        <p:style>
-          <a:lnRef idx="2">
-            <a:schemeClr val="accent1">
-              <a:shade val="50000"/>
-            </a:schemeClr>
-          </a:lnRef>
-          <a:fillRef idx="1">
-            <a:schemeClr val="accent1"/>
-          </a:fillRef>
-          <a:effectRef idx="0">
-            <a:schemeClr val="accent1"/>
-          </a:effectRef>
-          <a:fontRef idx="minor">
-            <a:schemeClr val="lt1"/>
-          </a:fontRef>
-        </p:style>
-        <p:txBody>
-          <a:bodyPr rtlCol="0" anchor="ctr"/>
-          <a:lstStyle/>
-          <a:p>
-            <a:pPr algn="ctr"/>
-            <a:r>
-              <a:rPr lang="es-MX" dirty="0"/>
-              <a:t>Ejecutar método </a:t>
+            <a:off x="3372608" y="4227611"/>
+            <a:ext cx="2516228" cy="874643"/>
+          </a:xfrm>
+          <a:prstGeom prst="rect">
+            <a:avLst/>
+          </a:prstGeom>
+        </p:spPr>
+        <p:style>
+          <a:lnRef idx="2">
+            <a:schemeClr val="accent1">
+              <a:shade val="50000"/>
+            </a:schemeClr>
+          </a:lnRef>
+          <a:fillRef idx="1">
+            <a:schemeClr val="accent1"/>
+          </a:fillRef>
+          <a:effectRef idx="0">
+            <a:schemeClr val="accent1"/>
+          </a:effectRef>
+          <a:fontRef idx="minor">
+            <a:schemeClr val="lt1"/>
+          </a:fontRef>
+        </p:style>
+        <p:txBody>
+          <a:bodyPr rtlCol="0" anchor="ctr"/>
+          <a:lstStyle/>
+          <a:p>
+            <a:pPr algn="ctr"/>
+            <a:r>
+              <a:rPr lang="es-MX" dirty="0"/>
+              <a:t>Ejecutar el método “</a:t>
             </a:r>
             <a:r>
               <a:rPr lang="es-MX" dirty="0" err="1"/>
               <a:t>VectorFiedlHistogram</a:t>
             </a:r>
-            <a:endParaRPr lang="es-MX" dirty="0"/>
+            <a:r>
+              <a:rPr lang="es-MX" dirty="0"/>
+              <a:t>”.</a:t>
+            </a:r>
           </a:p>
         </p:txBody>
       </p:sp>
@@ -7594,7 +10464,7 @@
             <a:pPr algn="ctr"/>
             <a:r>
               <a:rPr lang="es-MX" dirty="0"/>
-              <a:t>Propone un ángulo mas lejano por 15°.</a:t>
+              <a:t>Proponer un ángulo más lejano por 15°.</a:t>
             </a:r>
           </a:p>
         </p:txBody>
@@ -7643,7 +10513,7 @@
             <a:pPr algn="ctr"/>
             <a:r>
               <a:rPr lang="es-MX" dirty="0"/>
-              <a:t>Obtiene las componentes del ángulo en “x” y en “y”.</a:t>
+              <a:t>Obtener las componentes del ángulo en “x” y en “y”.</a:t>
             </a:r>
           </a:p>
         </p:txBody>
@@ -7692,7 +10562,7 @@
             <a:pPr algn="ctr"/>
             <a:r>
               <a:rPr lang="es-MX" dirty="0"/>
-              <a:t>Ejecutar método move2angle para alinear la orientación.</a:t>
+              <a:t>Ejecutar método “move2angle” para alinear la orientación.</a:t>
             </a:r>
           </a:p>
         </p:txBody>
@@ -7741,7 +10611,7 @@
             <a:pPr algn="ctr"/>
             <a:r>
               <a:rPr lang="es-MX" dirty="0"/>
-              <a:t>Regresa al programa</a:t>
+              <a:t>Regresar al programa.</a:t>
             </a:r>
           </a:p>
         </p:txBody>
@@ -7790,7 +10660,7 @@
             <a:pPr algn="ctr"/>
             <a:r>
               <a:rPr lang="es-MX" dirty="0"/>
-              <a:t>Regresa al programa</a:t>
+              <a:t>Regresar al programa.</a:t>
             </a:r>
           </a:p>
         </p:txBody>
@@ -7967,7 +10837,7 @@
             <a:pPr algn="ctr"/>
             <a:r>
               <a:rPr lang="es-MX" dirty="0"/>
-              <a:t>Calcula la diferencia angular entre las 2 posiciones seleccionando el ángulo de giro mas corto.</a:t>
+              <a:t>Calcular la diferencia angular entre las 2 posiciones seleccionando el ángulo de giro más corto.</a:t>
             </a:r>
           </a:p>
         </p:txBody>
@@ -8100,7 +10970,7 @@
             <a:pPr algn="ctr"/>
             <a:r>
               <a:rPr lang="es-MX" dirty="0"/>
-              <a:t>Define la velocidad lineal de cero.</a:t>
+              <a:t>Definir la velocidad lineal de cero.</a:t>
             </a:r>
           </a:p>
         </p:txBody>
@@ -8184,7 +11054,7 @@
             <a:pPr algn="ctr"/>
             <a:r>
               <a:rPr lang="es-MX" dirty="0"/>
-              <a:t>Define la velocidad lineal propuesta.</a:t>
+              <a:t>Definir la velocidad lineal propuesta.</a:t>
             </a:r>
           </a:p>
         </p:txBody>
@@ -8233,7 +11103,7 @@
             <a:pPr algn="ctr"/>
             <a:r>
               <a:rPr lang="es-MX" dirty="0"/>
-              <a:t>Propone la velocidad angular proporcional al ángulo, ajustándolo a los límites de velocidad del móvil.</a:t>
+              <a:t>Proponer la velocidad angular proporcional al ángulo, ajustándolo a los límites de velocidad del móvil.</a:t>
             </a:r>
           </a:p>
         </p:txBody>
@@ -8282,7 +11152,7 @@
             <a:pPr algn="ctr"/>
             <a:r>
               <a:rPr lang="es-MX" dirty="0"/>
-              <a:t>Publica la velocidad al robot líder para que avance.</a:t>
+              <a:t>Publicar la velocidad al robot líder para que avance.</a:t>
             </a:r>
           </a:p>
         </p:txBody>
@@ -8331,7 +11201,7 @@
             <a:pPr algn="ctr"/>
             <a:r>
               <a:rPr lang="es-MX" dirty="0"/>
-              <a:t>Se espera el tiempo definido.</a:t>
+              <a:t>Esperar el tiempo definido.</a:t>
             </a:r>
           </a:p>
         </p:txBody>
@@ -8380,7 +11250,7 @@
             <a:pPr algn="ctr"/>
             <a:r>
               <a:rPr lang="es-MX" dirty="0"/>
-              <a:t>Regresa al programa</a:t>
+              <a:t>Regresar al programa.</a:t>
             </a:r>
           </a:p>
         </p:txBody>
@@ -8577,7 +11447,7 @@
             <a:pPr algn="ctr"/>
             <a:r>
               <a:rPr lang="es-MX" dirty="0"/>
-              <a:t>Regreso al programa.</a:t>
+              <a:t>Regresar al programa.</a:t>
             </a:r>
           </a:p>
         </p:txBody>
@@ -8774,7 +11644,7 @@
             <a:pPr algn="ctr"/>
             <a:r>
               <a:rPr lang="es-MX" dirty="0"/>
-              <a:t>Regreso al programa.</a:t>
+              <a:t>Regresar al programa.</a:t>
             </a:r>
           </a:p>
         </p:txBody>
@@ -9001,7 +11871,7 @@
             <a:pPr algn="ctr"/>
             <a:r>
               <a:rPr lang="es-MX" dirty="0"/>
-              <a:t>Regreso al programa.</a:t>
+              <a:t>Regresar al programa.</a:t>
             </a:r>
           </a:p>
         </p:txBody>
@@ -9149,7 +12019,7 @@
             <a:pPr algn="ctr"/>
             <a:r>
               <a:rPr lang="es-MX" dirty="0"/>
-              <a:t>Regreso al programa.</a:t>
+              <a:t>Regresar al programa.</a:t>
             </a:r>
           </a:p>
         </p:txBody>
@@ -9248,7 +12118,7 @@
             <a:pPr algn="ctr"/>
             <a:r>
               <a:rPr lang="es-MX" dirty="0"/>
-              <a:t>Obtener y guardar si se avanza o no</a:t>
+              <a:t>Obtener y guardar si se avanza o no.</a:t>
             </a:r>
           </a:p>
         </p:txBody>
@@ -9297,7 +12167,7 @@
             <a:pPr algn="ctr"/>
             <a:r>
               <a:rPr lang="es-MX" dirty="0"/>
-              <a:t>Regreso al programa.</a:t>
+              <a:t>Regresar al programa.</a:t>
             </a:r>
           </a:p>
         </p:txBody>
@@ -9840,7 +12710,7 @@
             </a:r>
             <a:r>
               <a:rPr lang="es-MX" dirty="0"/>
-              <a:t>”</a:t>
+              <a:t>”.</a:t>
             </a:r>
           </a:p>
         </p:txBody>
@@ -9953,7 +12823,7 @@
       </p:sp>
       <p:sp>
         <p:nvSpPr>
-          <p:cNvPr id="8" name="Elipse 7">
+          <p:cNvPr id="8" name="Diagrama de flujo: terminador 7">
             <a:extLst>
               <a:ext uri="{FF2B5EF4-FFF2-40B4-BE49-F238E27FC236}">
                 <a16:creationId xmlns:a16="http://schemas.microsoft.com/office/drawing/2014/main" id="{B9EDE570-04E1-464C-A3E6-E398EA6EB865}"/>
@@ -9968,7 +12838,7 @@
             <a:off x="424621" y="5405231"/>
             <a:ext cx="2411896" cy="1113182"/>
           </a:xfrm>
-          <a:prstGeom prst="ellipse">
+          <a:prstGeom prst="flowChartTerminator">
             <a:avLst/>
           </a:prstGeom>
         </p:spPr>
@@ -10049,7 +12919,7 @@
         </p:nvSpPr>
         <p:spPr>
           <a:xfrm>
-            <a:off x="2907214" y="4504947"/>
+            <a:off x="2836517" y="4504947"/>
             <a:ext cx="343364" cy="369332"/>
           </a:xfrm>
           <a:prstGeom prst="rect">
@@ -10081,17 +12951,18 @@
           </p:cNvPr>
           <p:cNvCxnSpPr>
             <a:cxnSpLocks/>
+            <a:stCxn id="12" idx="3"/>
           </p:cNvCxnSpPr>
           <p:nvPr/>
         </p:nvCxnSpPr>
         <p:spPr>
           <a:xfrm flipH="1" flipV="1">
-            <a:off x="1630569" y="4068021"/>
-            <a:ext cx="1620009" cy="536713"/>
+            <a:off x="1630571" y="4068023"/>
+            <a:ext cx="1549310" cy="621590"/>
           </a:xfrm>
           <a:prstGeom prst="bentConnector3">
             <a:avLst>
-              <a:gd name="adj1" fmla="val -14111"/>
+              <a:gd name="adj1" fmla="val -14755"/>
             </a:avLst>
           </a:prstGeom>
           <a:ln>
@@ -10294,7 +13165,7 @@
             <a:pPr algn="ctr"/>
             <a:r>
               <a:rPr lang="es-MX" dirty="0"/>
-              <a:t>Regreso al programa.</a:t>
+              <a:t>Regresar al programa.</a:t>
             </a:r>
           </a:p>
         </p:txBody>
@@ -10442,7 +13313,7 @@
             <a:pPr algn="ctr"/>
             <a:r>
               <a:rPr lang="es-MX" dirty="0"/>
-              <a:t>Regreso al programa.</a:t>
+              <a:t>Regresar al programa.</a:t>
             </a:r>
           </a:p>
         </p:txBody>

</xml_diff>

<commit_message>
Modicación hasta Área funcional 4.
</commit_message>
<xml_diff>
--- a/Diagramas_de_flujo.pptx
+++ b/Diagramas_de_flujo.pptx
@@ -276,7 +276,7 @@
           <a:p>
             <a:fld id="{46728522-0A0C-4B69-AA92-5B61FB9D1D81}" type="datetimeFigureOut">
               <a:rPr lang="es-MX" smtClean="0"/>
-              <a:t>10/10/2019</a:t>
+              <a:t>15/10/2019</a:t>
             </a:fld>
             <a:endParaRPr lang="es-MX"/>
           </a:p>
@@ -476,7 +476,7 @@
           <a:p>
             <a:fld id="{46728522-0A0C-4B69-AA92-5B61FB9D1D81}" type="datetimeFigureOut">
               <a:rPr lang="es-MX" smtClean="0"/>
-              <a:t>10/10/2019</a:t>
+              <a:t>15/10/2019</a:t>
             </a:fld>
             <a:endParaRPr lang="es-MX"/>
           </a:p>
@@ -686,7 +686,7 @@
           <a:p>
             <a:fld id="{46728522-0A0C-4B69-AA92-5B61FB9D1D81}" type="datetimeFigureOut">
               <a:rPr lang="es-MX" smtClean="0"/>
-              <a:t>10/10/2019</a:t>
+              <a:t>15/10/2019</a:t>
             </a:fld>
             <a:endParaRPr lang="es-MX"/>
           </a:p>
@@ -886,7 +886,7 @@
           <a:p>
             <a:fld id="{46728522-0A0C-4B69-AA92-5B61FB9D1D81}" type="datetimeFigureOut">
               <a:rPr lang="es-MX" smtClean="0"/>
-              <a:t>10/10/2019</a:t>
+              <a:t>15/10/2019</a:t>
             </a:fld>
             <a:endParaRPr lang="es-MX"/>
           </a:p>
@@ -1162,7 +1162,7 @@
           <a:p>
             <a:fld id="{46728522-0A0C-4B69-AA92-5B61FB9D1D81}" type="datetimeFigureOut">
               <a:rPr lang="es-MX" smtClean="0"/>
-              <a:t>10/10/2019</a:t>
+              <a:t>15/10/2019</a:t>
             </a:fld>
             <a:endParaRPr lang="es-MX"/>
           </a:p>
@@ -1430,7 +1430,7 @@
           <a:p>
             <a:fld id="{46728522-0A0C-4B69-AA92-5B61FB9D1D81}" type="datetimeFigureOut">
               <a:rPr lang="es-MX" smtClean="0"/>
-              <a:t>10/10/2019</a:t>
+              <a:t>15/10/2019</a:t>
             </a:fld>
             <a:endParaRPr lang="es-MX"/>
           </a:p>
@@ -1845,7 +1845,7 @@
           <a:p>
             <a:fld id="{46728522-0A0C-4B69-AA92-5B61FB9D1D81}" type="datetimeFigureOut">
               <a:rPr lang="es-MX" smtClean="0"/>
-              <a:t>10/10/2019</a:t>
+              <a:t>15/10/2019</a:t>
             </a:fld>
             <a:endParaRPr lang="es-MX"/>
           </a:p>
@@ -1987,7 +1987,7 @@
           <a:p>
             <a:fld id="{46728522-0A0C-4B69-AA92-5B61FB9D1D81}" type="datetimeFigureOut">
               <a:rPr lang="es-MX" smtClean="0"/>
-              <a:t>10/10/2019</a:t>
+              <a:t>15/10/2019</a:t>
             </a:fld>
             <a:endParaRPr lang="es-MX"/>
           </a:p>
@@ -2100,7 +2100,7 @@
           <a:p>
             <a:fld id="{46728522-0A0C-4B69-AA92-5B61FB9D1D81}" type="datetimeFigureOut">
               <a:rPr lang="es-MX" smtClean="0"/>
-              <a:t>10/10/2019</a:t>
+              <a:t>15/10/2019</a:t>
             </a:fld>
             <a:endParaRPr lang="es-MX"/>
           </a:p>
@@ -2413,7 +2413,7 @@
           <a:p>
             <a:fld id="{46728522-0A0C-4B69-AA92-5B61FB9D1D81}" type="datetimeFigureOut">
               <a:rPr lang="es-MX" smtClean="0"/>
-              <a:t>10/10/2019</a:t>
+              <a:t>15/10/2019</a:t>
             </a:fld>
             <a:endParaRPr lang="es-MX"/>
           </a:p>
@@ -2702,7 +2702,7 @@
           <a:p>
             <a:fld id="{46728522-0A0C-4B69-AA92-5B61FB9D1D81}" type="datetimeFigureOut">
               <a:rPr lang="es-MX" smtClean="0"/>
-              <a:t>10/10/2019</a:t>
+              <a:t>15/10/2019</a:t>
             </a:fld>
             <a:endParaRPr lang="es-MX"/>
           </a:p>
@@ -2945,7 +2945,7 @@
           <a:p>
             <a:fld id="{46728522-0A0C-4B69-AA92-5B61FB9D1D81}" type="datetimeFigureOut">
               <a:rPr lang="es-MX" smtClean="0"/>
-              <a:t>10/10/2019</a:t>
+              <a:t>15/10/2019</a:t>
             </a:fld>
             <a:endParaRPr lang="es-MX"/>
           </a:p>

</xml_diff>